<commit_message>
Step 1-3 are prepared to review
</commit_message>
<xml_diff>
--- a/Step01-Model_presentation.pptx
+++ b/Step01-Model_presentation.pptx
@@ -238,8 +238,7 @@
 <file path=ppt/revisionInfo.xml><?xml version="1.0" encoding="utf-8"?>
 <p1510:revInfo xmlns:a="http://schemas.openxmlformats.org/drawingml/2006/main" xmlns:r="http://schemas.openxmlformats.org/officeDocument/2006/relationships" xmlns:p1510="http://schemas.microsoft.com/office/powerpoint/2015/10/main">
   <p1510:revLst>
-    <p1510:client id="{8C05140D-7668-4267-B009-985EF5C6B6AF}" v="9" dt="2024-01-24T16:35:34.496"/>
-    <p1510:client id="{D05EAF56-C8F0-4612-806C-93E1C27F1929}" v="29" dt="2024-01-25T12:19:24.226"/>
+    <p1510:client id="{D05EAF56-C8F0-4612-806C-93E1C27F1929}" v="51" dt="2024-01-26T13:44:12.338"/>
   </p1510:revLst>
 </p1510:revInfo>
 </file>
@@ -550,7 +549,7 @@
   <pc:docChgLst>
     <pc:chgData name="Ihor Aleksandrov" userId="c3051032-6b87-4db2-b257-777a0106fbd9" providerId="ADAL" clId="{D05EAF56-C8F0-4612-806C-93E1C27F1929}"/>
     <pc:docChg chg="undo redo custSel addSld delSld modSld sldOrd addMainMaster addSection modSection">
-      <pc:chgData name="Ihor Aleksandrov" userId="c3051032-6b87-4db2-b257-777a0106fbd9" providerId="ADAL" clId="{D05EAF56-C8F0-4612-806C-93E1C27F1929}" dt="2024-01-25T12:18:42.706" v="325"/>
+      <pc:chgData name="Ihor Aleksandrov" userId="c3051032-6b87-4db2-b257-777a0106fbd9" providerId="ADAL" clId="{D05EAF56-C8F0-4612-806C-93E1C27F1929}" dt="2024-01-26T13:44:16.814" v="425" actId="1076"/>
       <pc:docMkLst>
         <pc:docMk/>
       </pc:docMkLst>
@@ -601,8 +600,39 @@
           </ac:spMkLst>
         </pc:spChg>
       </pc:sldChg>
-      <pc:sldChg chg="modSp mod">
-        <pc:chgData name="Ihor Aleksandrov" userId="c3051032-6b87-4db2-b257-777a0106fbd9" providerId="ADAL" clId="{D05EAF56-C8F0-4612-806C-93E1C27F1929}" dt="2024-01-25T11:00:29.329" v="160"/>
+      <pc:sldChg chg="addSp delSp modSp mod">
+        <pc:chgData name="Ihor Aleksandrov" userId="c3051032-6b87-4db2-b257-777a0106fbd9" providerId="ADAL" clId="{D05EAF56-C8F0-4612-806C-93E1C27F1929}" dt="2024-01-26T13:15:16.750" v="329" actId="1076"/>
+        <pc:sldMkLst>
+          <pc:docMk/>
+          <pc:sldMk cId="1539823432" sldId="258"/>
+        </pc:sldMkLst>
+        <pc:spChg chg="mod">
+          <ac:chgData name="Ihor Aleksandrov" userId="c3051032-6b87-4db2-b257-777a0106fbd9" providerId="ADAL" clId="{D05EAF56-C8F0-4612-806C-93E1C27F1929}" dt="2024-01-26T13:15:06.142" v="326" actId="20577"/>
+          <ac:spMkLst>
+            <pc:docMk/>
+            <pc:sldMk cId="1539823432" sldId="258"/>
+            <ac:spMk id="2" creationId="{53C5D828-9666-E312-B574-9FE965A7D6BE}"/>
+          </ac:spMkLst>
+        </pc:spChg>
+        <pc:spChg chg="del">
+          <ac:chgData name="Ihor Aleksandrov" userId="c3051032-6b87-4db2-b257-777a0106fbd9" providerId="ADAL" clId="{D05EAF56-C8F0-4612-806C-93E1C27F1929}" dt="2024-01-26T13:15:11.877" v="327" actId="478"/>
+          <ac:spMkLst>
+            <pc:docMk/>
+            <pc:sldMk cId="1539823432" sldId="258"/>
+            <ac:spMk id="3" creationId="{F79F3174-C140-0248-35F5-C80A867261E7}"/>
+          </ac:spMkLst>
+        </pc:spChg>
+        <pc:picChg chg="add mod">
+          <ac:chgData name="Ihor Aleksandrov" userId="c3051032-6b87-4db2-b257-777a0106fbd9" providerId="ADAL" clId="{D05EAF56-C8F0-4612-806C-93E1C27F1929}" dt="2024-01-26T13:15:16.750" v="329" actId="1076"/>
+          <ac:picMkLst>
+            <pc:docMk/>
+            <pc:sldMk cId="1539823432" sldId="258"/>
+            <ac:picMk id="5" creationId="{647C4A66-CC34-41A1-6251-F783DFA58E4F}"/>
+          </ac:picMkLst>
+        </pc:picChg>
+      </pc:sldChg>
+      <pc:sldChg chg="addSp delSp modSp mod">
+        <pc:chgData name="Ihor Aleksandrov" userId="c3051032-6b87-4db2-b257-777a0106fbd9" providerId="ADAL" clId="{D05EAF56-C8F0-4612-806C-93E1C27F1929}" dt="2024-01-26T13:27:11.571" v="358" actId="1076"/>
         <pc:sldMkLst>
           <pc:docMk/>
           <pc:sldMk cId="3569579791" sldId="265"/>
@@ -615,6 +645,92 @@
             <ac:spMk id="2" creationId="{53C5D828-9666-E312-B574-9FE965A7D6BE}"/>
           </ac:spMkLst>
         </pc:spChg>
+        <pc:spChg chg="del">
+          <ac:chgData name="Ihor Aleksandrov" userId="c3051032-6b87-4db2-b257-777a0106fbd9" providerId="ADAL" clId="{D05EAF56-C8F0-4612-806C-93E1C27F1929}" dt="2024-01-26T13:23:25.296" v="346" actId="478"/>
+          <ac:spMkLst>
+            <pc:docMk/>
+            <pc:sldMk cId="3569579791" sldId="265"/>
+            <ac:spMk id="6" creationId="{E04F08BD-B70E-B1A8-7328-EE29B18E4AA1}"/>
+          </ac:spMkLst>
+        </pc:spChg>
+        <pc:picChg chg="add del mod">
+          <ac:chgData name="Ihor Aleksandrov" userId="c3051032-6b87-4db2-b257-777a0106fbd9" providerId="ADAL" clId="{D05EAF56-C8F0-4612-806C-93E1C27F1929}" dt="2024-01-26T13:17:09.608" v="332" actId="478"/>
+          <ac:picMkLst>
+            <pc:docMk/>
+            <pc:sldMk cId="3569579791" sldId="265"/>
+            <ac:picMk id="4" creationId="{CD3A60E7-0546-1B25-0C15-81EF4DA129F4}"/>
+          </ac:picMkLst>
+        </pc:picChg>
+        <pc:picChg chg="add del mod">
+          <ac:chgData name="Ihor Aleksandrov" userId="c3051032-6b87-4db2-b257-777a0106fbd9" providerId="ADAL" clId="{D05EAF56-C8F0-4612-806C-93E1C27F1929}" dt="2024-01-26T13:19:22.960" v="338"/>
+          <ac:picMkLst>
+            <pc:docMk/>
+            <pc:sldMk cId="3569579791" sldId="265"/>
+            <ac:picMk id="5" creationId="{5CF72D38-7177-8B12-45AC-C442EE6DE9F9}"/>
+          </ac:picMkLst>
+        </pc:picChg>
+        <pc:picChg chg="add del mod">
+          <ac:chgData name="Ihor Aleksandrov" userId="c3051032-6b87-4db2-b257-777a0106fbd9" providerId="ADAL" clId="{D05EAF56-C8F0-4612-806C-93E1C27F1929}" dt="2024-01-26T13:19:54.091" v="341" actId="478"/>
+          <ac:picMkLst>
+            <pc:docMk/>
+            <pc:sldMk cId="3569579791" sldId="265"/>
+            <ac:picMk id="7" creationId="{88FBDFA2-2790-3F25-25A7-EA4EEC2FFA49}"/>
+          </ac:picMkLst>
+        </pc:picChg>
+        <pc:picChg chg="add mod">
+          <ac:chgData name="Ihor Aleksandrov" userId="c3051032-6b87-4db2-b257-777a0106fbd9" providerId="ADAL" clId="{D05EAF56-C8F0-4612-806C-93E1C27F1929}" dt="2024-01-26T13:27:11.571" v="358" actId="1076"/>
+          <ac:picMkLst>
+            <pc:docMk/>
+            <pc:sldMk cId="3569579791" sldId="265"/>
+            <ac:picMk id="8" creationId="{5E021E4D-8FA0-4660-5BEF-76686E057B60}"/>
+          </ac:picMkLst>
+        </pc:picChg>
+      </pc:sldChg>
+      <pc:sldChg chg="addSp delSp modSp mod">
+        <pc:chgData name="Ihor Aleksandrov" userId="c3051032-6b87-4db2-b257-777a0106fbd9" providerId="ADAL" clId="{D05EAF56-C8F0-4612-806C-93E1C27F1929}" dt="2024-01-26T13:26:42.696" v="357" actId="1076"/>
+        <pc:sldMkLst>
+          <pc:docMk/>
+          <pc:sldMk cId="1545179861" sldId="266"/>
+        </pc:sldMkLst>
+        <pc:spChg chg="del">
+          <ac:chgData name="Ihor Aleksandrov" userId="c3051032-6b87-4db2-b257-777a0106fbd9" providerId="ADAL" clId="{D05EAF56-C8F0-4612-806C-93E1C27F1929}" dt="2024-01-26T13:26:39.324" v="356" actId="478"/>
+          <ac:spMkLst>
+            <pc:docMk/>
+            <pc:sldMk cId="1545179861" sldId="266"/>
+            <ac:spMk id="6" creationId="{E04F08BD-B70E-B1A8-7328-EE29B18E4AA1}"/>
+          </ac:spMkLst>
+        </pc:spChg>
+        <pc:picChg chg="add mod">
+          <ac:chgData name="Ihor Aleksandrov" userId="c3051032-6b87-4db2-b257-777a0106fbd9" providerId="ADAL" clId="{D05EAF56-C8F0-4612-806C-93E1C27F1929}" dt="2024-01-26T13:26:42.696" v="357" actId="1076"/>
+          <ac:picMkLst>
+            <pc:docMk/>
+            <pc:sldMk cId="1545179861" sldId="266"/>
+            <ac:picMk id="5" creationId="{5569BDEA-DAC2-A509-CC95-A1A1249837C8}"/>
+          </ac:picMkLst>
+        </pc:picChg>
+      </pc:sldChg>
+      <pc:sldChg chg="addSp delSp modSp mod">
+        <pc:chgData name="Ihor Aleksandrov" userId="c3051032-6b87-4db2-b257-777a0106fbd9" providerId="ADAL" clId="{D05EAF56-C8F0-4612-806C-93E1C27F1929}" dt="2024-01-26T13:28:11.012" v="367" actId="1076"/>
+        <pc:sldMkLst>
+          <pc:docMk/>
+          <pc:sldMk cId="2423524645" sldId="267"/>
+        </pc:sldMkLst>
+        <pc:spChg chg="del mod">
+          <ac:chgData name="Ihor Aleksandrov" userId="c3051032-6b87-4db2-b257-777a0106fbd9" providerId="ADAL" clId="{D05EAF56-C8F0-4612-806C-93E1C27F1929}" dt="2024-01-26T13:28:02.285" v="363" actId="478"/>
+          <ac:spMkLst>
+            <pc:docMk/>
+            <pc:sldMk cId="2423524645" sldId="267"/>
+            <ac:spMk id="6" creationId="{E04F08BD-B70E-B1A8-7328-EE29B18E4AA1}"/>
+          </ac:spMkLst>
+        </pc:spChg>
+        <pc:picChg chg="add mod">
+          <ac:chgData name="Ihor Aleksandrov" userId="c3051032-6b87-4db2-b257-777a0106fbd9" providerId="ADAL" clId="{D05EAF56-C8F0-4612-806C-93E1C27F1929}" dt="2024-01-26T13:28:11.012" v="367" actId="1076"/>
+          <ac:picMkLst>
+            <pc:docMk/>
+            <pc:sldMk cId="2423524645" sldId="267"/>
+            <ac:picMk id="5" creationId="{5371BBC4-E1E6-52BC-8A5F-ED6DCBF94F0F}"/>
+          </ac:picMkLst>
+        </pc:picChg>
       </pc:sldChg>
       <pc:sldChg chg="addSp delSp modSp add mod">
         <pc:chgData name="Ihor Aleksandrov" userId="c3051032-6b87-4db2-b257-777a0106fbd9" providerId="ADAL" clId="{D05EAF56-C8F0-4612-806C-93E1C27F1929}" dt="2024-01-25T10:19:44.220" v="11" actId="1076"/>
@@ -1018,8 +1134,8 @@
           </ac:spMkLst>
         </pc:spChg>
       </pc:sldChg>
-      <pc:sldChg chg="modSp add mod ord">
-        <pc:chgData name="Ihor Aleksandrov" userId="c3051032-6b87-4db2-b257-777a0106fbd9" providerId="ADAL" clId="{D05EAF56-C8F0-4612-806C-93E1C27F1929}" dt="2024-01-25T11:01:05.747" v="171"/>
+      <pc:sldChg chg="addSp delSp modSp add mod ord">
+        <pc:chgData name="Ihor Aleksandrov" userId="c3051032-6b87-4db2-b257-777a0106fbd9" providerId="ADAL" clId="{D05EAF56-C8F0-4612-806C-93E1C27F1929}" dt="2024-01-26T13:33:01.136" v="373" actId="1076"/>
         <pc:sldMkLst>
           <pc:docMk/>
           <pc:sldMk cId="2433051637" sldId="283"/>
@@ -1032,6 +1148,22 @@
             <ac:spMk id="2" creationId="{53C5D828-9666-E312-B574-9FE965A7D6BE}"/>
           </ac:spMkLst>
         </pc:spChg>
+        <pc:spChg chg="del">
+          <ac:chgData name="Ihor Aleksandrov" userId="c3051032-6b87-4db2-b257-777a0106fbd9" providerId="ADAL" clId="{D05EAF56-C8F0-4612-806C-93E1C27F1929}" dt="2024-01-26T13:32:55.530" v="368" actId="478"/>
+          <ac:spMkLst>
+            <pc:docMk/>
+            <pc:sldMk cId="2433051637" sldId="283"/>
+            <ac:spMk id="6" creationId="{E04F08BD-B70E-B1A8-7328-EE29B18E4AA1}"/>
+          </ac:spMkLst>
+        </pc:spChg>
+        <pc:picChg chg="add mod">
+          <ac:chgData name="Ihor Aleksandrov" userId="c3051032-6b87-4db2-b257-777a0106fbd9" providerId="ADAL" clId="{D05EAF56-C8F0-4612-806C-93E1C27F1929}" dt="2024-01-26T13:33:01.136" v="373" actId="1076"/>
+          <ac:picMkLst>
+            <pc:docMk/>
+            <pc:sldMk cId="2433051637" sldId="283"/>
+            <ac:picMk id="5" creationId="{639E5029-74DB-1BE3-178A-EFC0C60D5B22}"/>
+          </ac:picMkLst>
+        </pc:picChg>
       </pc:sldChg>
       <pc:sldChg chg="addSp delSp modSp add mod">
         <pc:chgData name="Ihor Aleksandrov" userId="c3051032-6b87-4db2-b257-777a0106fbd9" providerId="ADAL" clId="{D05EAF56-C8F0-4612-806C-93E1C27F1929}" dt="2024-01-25T11:22:22.700" v="219" actId="14100"/>
@@ -1110,8 +1242,8 @@
           </ac:picMkLst>
         </pc:picChg>
       </pc:sldChg>
-      <pc:sldChg chg="modSp add mod ord">
-        <pc:chgData name="Ihor Aleksandrov" userId="c3051032-6b87-4db2-b257-777a0106fbd9" providerId="ADAL" clId="{D05EAF56-C8F0-4612-806C-93E1C27F1929}" dt="2024-01-25T11:10:32.927" v="210"/>
+      <pc:sldChg chg="addSp delSp modSp add mod ord">
+        <pc:chgData name="Ihor Aleksandrov" userId="c3051032-6b87-4db2-b257-777a0106fbd9" providerId="ADAL" clId="{D05EAF56-C8F0-4612-806C-93E1C27F1929}" dt="2024-01-26T13:37:01.169" v="377" actId="14100"/>
         <pc:sldMkLst>
           <pc:docMk/>
           <pc:sldMk cId="1586376586" sldId="286"/>
@@ -1124,6 +1256,22 @@
             <ac:spMk id="2" creationId="{53C5D828-9666-E312-B574-9FE965A7D6BE}"/>
           </ac:spMkLst>
         </pc:spChg>
+        <pc:spChg chg="del">
+          <ac:chgData name="Ihor Aleksandrov" userId="c3051032-6b87-4db2-b257-777a0106fbd9" providerId="ADAL" clId="{D05EAF56-C8F0-4612-806C-93E1C27F1929}" dt="2024-01-26T13:36:55.894" v="374" actId="478"/>
+          <ac:spMkLst>
+            <pc:docMk/>
+            <pc:sldMk cId="1586376586" sldId="286"/>
+            <ac:spMk id="6" creationId="{E04F08BD-B70E-B1A8-7328-EE29B18E4AA1}"/>
+          </ac:spMkLst>
+        </pc:spChg>
+        <pc:picChg chg="add mod">
+          <ac:chgData name="Ihor Aleksandrov" userId="c3051032-6b87-4db2-b257-777a0106fbd9" providerId="ADAL" clId="{D05EAF56-C8F0-4612-806C-93E1C27F1929}" dt="2024-01-26T13:37:01.169" v="377" actId="14100"/>
+          <ac:picMkLst>
+            <pc:docMk/>
+            <pc:sldMk cId="1586376586" sldId="286"/>
+            <ac:picMk id="5" creationId="{76DCE5B1-23CA-917E-991B-373BB3E033F8}"/>
+          </ac:picMkLst>
+        </pc:picChg>
       </pc:sldChg>
       <pc:sldChg chg="add del">
         <pc:chgData name="Ihor Aleksandrov" userId="c3051032-6b87-4db2-b257-777a0106fbd9" providerId="ADAL" clId="{D05EAF56-C8F0-4612-806C-93E1C27F1929}" dt="2024-01-25T11:10:15.704" v="204" actId="2696"/>
@@ -1224,8 +1372,8 @@
           </ac:picMkLst>
         </pc:picChg>
       </pc:sldChg>
-      <pc:sldChg chg="modSp add mod ord">
-        <pc:chgData name="Ihor Aleksandrov" userId="c3051032-6b87-4db2-b257-777a0106fbd9" providerId="ADAL" clId="{D05EAF56-C8F0-4612-806C-93E1C27F1929}" dt="2024-01-25T11:51:45.959" v="263"/>
+      <pc:sldChg chg="addSp delSp modSp add mod ord">
+        <pc:chgData name="Ihor Aleksandrov" userId="c3051032-6b87-4db2-b257-777a0106fbd9" providerId="ADAL" clId="{D05EAF56-C8F0-4612-806C-93E1C27F1929}" dt="2024-01-26T13:41:34.391" v="390" actId="1076"/>
         <pc:sldMkLst>
           <pc:docMk/>
           <pc:sldMk cId="1018496090" sldId="291"/>
@@ -1238,9 +1386,25 @@
             <ac:spMk id="2" creationId="{53C5D828-9666-E312-B574-9FE965A7D6BE}"/>
           </ac:spMkLst>
         </pc:spChg>
+        <pc:spChg chg="del">
+          <ac:chgData name="Ihor Aleksandrov" userId="c3051032-6b87-4db2-b257-777a0106fbd9" providerId="ADAL" clId="{D05EAF56-C8F0-4612-806C-93E1C27F1929}" dt="2024-01-26T13:41:30.767" v="388" actId="478"/>
+          <ac:spMkLst>
+            <pc:docMk/>
+            <pc:sldMk cId="1018496090" sldId="291"/>
+            <ac:spMk id="6" creationId="{E04F08BD-B70E-B1A8-7328-EE29B18E4AA1}"/>
+          </ac:spMkLst>
+        </pc:spChg>
+        <pc:picChg chg="add mod">
+          <ac:chgData name="Ihor Aleksandrov" userId="c3051032-6b87-4db2-b257-777a0106fbd9" providerId="ADAL" clId="{D05EAF56-C8F0-4612-806C-93E1C27F1929}" dt="2024-01-26T13:41:34.391" v="390" actId="1076"/>
+          <ac:picMkLst>
+            <pc:docMk/>
+            <pc:sldMk cId="1018496090" sldId="291"/>
+            <ac:picMk id="4" creationId="{318EBA90-4820-53D1-993B-2BFEBFC41459}"/>
+          </ac:picMkLst>
+        </pc:picChg>
       </pc:sldChg>
-      <pc:sldChg chg="modSp add mod">
-        <pc:chgData name="Ihor Aleksandrov" userId="c3051032-6b87-4db2-b257-777a0106fbd9" providerId="ADAL" clId="{D05EAF56-C8F0-4612-806C-93E1C27F1929}" dt="2024-01-25T11:53:09.928" v="267"/>
+      <pc:sldChg chg="addSp delSp modSp add mod">
+        <pc:chgData name="Ihor Aleksandrov" userId="c3051032-6b87-4db2-b257-777a0106fbd9" providerId="ADAL" clId="{D05EAF56-C8F0-4612-806C-93E1C27F1929}" dt="2024-01-26T13:41:42.312" v="393" actId="1076"/>
         <pc:sldMkLst>
           <pc:docMk/>
           <pc:sldMk cId="2128635244" sldId="292"/>
@@ -1253,6 +1417,30 @@
             <ac:spMk id="2" creationId="{53C5D828-9666-E312-B574-9FE965A7D6BE}"/>
           </ac:spMkLst>
         </pc:spChg>
+        <pc:spChg chg="del">
+          <ac:chgData name="Ihor Aleksandrov" userId="c3051032-6b87-4db2-b257-777a0106fbd9" providerId="ADAL" clId="{D05EAF56-C8F0-4612-806C-93E1C27F1929}" dt="2024-01-26T13:40:12.821" v="378" actId="478"/>
+          <ac:spMkLst>
+            <pc:docMk/>
+            <pc:sldMk cId="2128635244" sldId="292"/>
+            <ac:spMk id="6" creationId="{E04F08BD-B70E-B1A8-7328-EE29B18E4AA1}"/>
+          </ac:spMkLst>
+        </pc:spChg>
+        <pc:picChg chg="add del mod">
+          <ac:chgData name="Ihor Aleksandrov" userId="c3051032-6b87-4db2-b257-777a0106fbd9" providerId="ADAL" clId="{D05EAF56-C8F0-4612-806C-93E1C27F1929}" dt="2024-01-26T13:41:27.791" v="387" actId="21"/>
+          <ac:picMkLst>
+            <pc:docMk/>
+            <pc:sldMk cId="2128635244" sldId="292"/>
+            <ac:picMk id="5" creationId="{28923FF5-69F9-3E1F-A70C-B1A1D9B8197C}"/>
+          </ac:picMkLst>
+        </pc:picChg>
+        <pc:picChg chg="add mod">
+          <ac:chgData name="Ihor Aleksandrov" userId="c3051032-6b87-4db2-b257-777a0106fbd9" providerId="ADAL" clId="{D05EAF56-C8F0-4612-806C-93E1C27F1929}" dt="2024-01-26T13:41:42.312" v="393" actId="1076"/>
+          <ac:picMkLst>
+            <pc:docMk/>
+            <pc:sldMk cId="2128635244" sldId="292"/>
+            <ac:picMk id="8" creationId="{3BEB5BCB-4133-D791-E012-4082550F8E46}"/>
+          </ac:picMkLst>
+        </pc:picChg>
       </pc:sldChg>
       <pc:sldChg chg="addSp delSp modSp add mod">
         <pc:chgData name="Ihor Aleksandrov" userId="c3051032-6b87-4db2-b257-777a0106fbd9" providerId="ADAL" clId="{D05EAF56-C8F0-4612-806C-93E1C27F1929}" dt="2024-01-25T11:55:41.171" v="279" actId="1076"/>
@@ -1339,8 +1527,8 @@
           </ac:picMkLst>
         </pc:picChg>
       </pc:sldChg>
-      <pc:sldChg chg="modSp add mod ord">
-        <pc:chgData name="Ihor Aleksandrov" userId="c3051032-6b87-4db2-b257-777a0106fbd9" providerId="ADAL" clId="{D05EAF56-C8F0-4612-806C-93E1C27F1929}" dt="2024-01-25T12:02:45.112" v="310"/>
+      <pc:sldChg chg="addSp delSp modSp add mod ord">
+        <pc:chgData name="Ihor Aleksandrov" userId="c3051032-6b87-4db2-b257-777a0106fbd9" providerId="ADAL" clId="{D05EAF56-C8F0-4612-806C-93E1C27F1929}" dt="2024-01-26T13:43:37.890" v="398" actId="1076"/>
         <pc:sldMkLst>
           <pc:docMk/>
           <pc:sldMk cId="2389832786" sldId="296"/>
@@ -1353,9 +1541,25 @@
             <ac:spMk id="2" creationId="{53C5D828-9666-E312-B574-9FE965A7D6BE}"/>
           </ac:spMkLst>
         </pc:spChg>
+        <pc:spChg chg="del mod">
+          <ac:chgData name="Ihor Aleksandrov" userId="c3051032-6b87-4db2-b257-777a0106fbd9" providerId="ADAL" clId="{D05EAF56-C8F0-4612-806C-93E1C27F1929}" dt="2024-01-26T13:43:35.440" v="397" actId="478"/>
+          <ac:spMkLst>
+            <pc:docMk/>
+            <pc:sldMk cId="2389832786" sldId="296"/>
+            <ac:spMk id="6" creationId="{E04F08BD-B70E-B1A8-7328-EE29B18E4AA1}"/>
+          </ac:spMkLst>
+        </pc:spChg>
+        <pc:picChg chg="add mod">
+          <ac:chgData name="Ihor Aleksandrov" userId="c3051032-6b87-4db2-b257-777a0106fbd9" providerId="ADAL" clId="{D05EAF56-C8F0-4612-806C-93E1C27F1929}" dt="2024-01-26T13:43:37.890" v="398" actId="1076"/>
+          <ac:picMkLst>
+            <pc:docMk/>
+            <pc:sldMk cId="2389832786" sldId="296"/>
+            <ac:picMk id="5" creationId="{57BC5937-2120-D4A1-5703-44715220912C}"/>
+          </ac:picMkLst>
+        </pc:picChg>
       </pc:sldChg>
-      <pc:sldChg chg="modSp add mod">
-        <pc:chgData name="Ihor Aleksandrov" userId="c3051032-6b87-4db2-b257-777a0106fbd9" providerId="ADAL" clId="{D05EAF56-C8F0-4612-806C-93E1C27F1929}" dt="2024-01-25T12:04:01.736" v="312"/>
+      <pc:sldChg chg="addSp delSp modSp add mod">
+        <pc:chgData name="Ihor Aleksandrov" userId="c3051032-6b87-4db2-b257-777a0106fbd9" providerId="ADAL" clId="{D05EAF56-C8F0-4612-806C-93E1C27F1929}" dt="2024-01-26T13:43:48.188" v="405" actId="1076"/>
         <pc:sldMkLst>
           <pc:docMk/>
           <pc:sldMk cId="2189799752" sldId="297"/>
@@ -1368,9 +1572,25 @@
             <ac:spMk id="2" creationId="{53C5D828-9666-E312-B574-9FE965A7D6BE}"/>
           </ac:spMkLst>
         </pc:spChg>
+        <pc:spChg chg="del">
+          <ac:chgData name="Ihor Aleksandrov" userId="c3051032-6b87-4db2-b257-777a0106fbd9" providerId="ADAL" clId="{D05EAF56-C8F0-4612-806C-93E1C27F1929}" dt="2024-01-26T13:43:40.934" v="399" actId="478"/>
+          <ac:spMkLst>
+            <pc:docMk/>
+            <pc:sldMk cId="2189799752" sldId="297"/>
+            <ac:spMk id="6" creationId="{E04F08BD-B70E-B1A8-7328-EE29B18E4AA1}"/>
+          </ac:spMkLst>
+        </pc:spChg>
+        <pc:picChg chg="add mod">
+          <ac:chgData name="Ihor Aleksandrov" userId="c3051032-6b87-4db2-b257-777a0106fbd9" providerId="ADAL" clId="{D05EAF56-C8F0-4612-806C-93E1C27F1929}" dt="2024-01-26T13:43:48.188" v="405" actId="1076"/>
+          <ac:picMkLst>
+            <pc:docMk/>
+            <pc:sldMk cId="2189799752" sldId="297"/>
+            <ac:picMk id="5" creationId="{98AD4C22-F45A-B1FB-B5F4-0A006DF9C2E6}"/>
+          </ac:picMkLst>
+        </pc:picChg>
       </pc:sldChg>
-      <pc:sldChg chg="modSp add mod">
-        <pc:chgData name="Ihor Aleksandrov" userId="c3051032-6b87-4db2-b257-777a0106fbd9" providerId="ADAL" clId="{D05EAF56-C8F0-4612-806C-93E1C27F1929}" dt="2024-01-25T12:05:00.878" v="314"/>
+      <pc:sldChg chg="addSp delSp modSp add mod">
+        <pc:chgData name="Ihor Aleksandrov" userId="c3051032-6b87-4db2-b257-777a0106fbd9" providerId="ADAL" clId="{D05EAF56-C8F0-4612-806C-93E1C27F1929}" dt="2024-01-26T13:43:55.481" v="410" actId="1076"/>
         <pc:sldMkLst>
           <pc:docMk/>
           <pc:sldMk cId="3592285454" sldId="298"/>
@@ -1383,9 +1603,25 @@
             <ac:spMk id="2" creationId="{53C5D828-9666-E312-B574-9FE965A7D6BE}"/>
           </ac:spMkLst>
         </pc:spChg>
+        <pc:spChg chg="del">
+          <ac:chgData name="Ihor Aleksandrov" userId="c3051032-6b87-4db2-b257-777a0106fbd9" providerId="ADAL" clId="{D05EAF56-C8F0-4612-806C-93E1C27F1929}" dt="2024-01-26T13:43:52.814" v="409" actId="478"/>
+          <ac:spMkLst>
+            <pc:docMk/>
+            <pc:sldMk cId="3592285454" sldId="298"/>
+            <ac:spMk id="6" creationId="{E04F08BD-B70E-B1A8-7328-EE29B18E4AA1}"/>
+          </ac:spMkLst>
+        </pc:spChg>
+        <pc:picChg chg="add mod">
+          <ac:chgData name="Ihor Aleksandrov" userId="c3051032-6b87-4db2-b257-777a0106fbd9" providerId="ADAL" clId="{D05EAF56-C8F0-4612-806C-93E1C27F1929}" dt="2024-01-26T13:43:55.481" v="410" actId="1076"/>
+          <ac:picMkLst>
+            <pc:docMk/>
+            <pc:sldMk cId="3592285454" sldId="298"/>
+            <ac:picMk id="5" creationId="{7006CD2F-79F3-55BB-9846-61F935AC39F3}"/>
+          </ac:picMkLst>
+        </pc:picChg>
       </pc:sldChg>
-      <pc:sldChg chg="modSp add mod">
-        <pc:chgData name="Ihor Aleksandrov" userId="c3051032-6b87-4db2-b257-777a0106fbd9" providerId="ADAL" clId="{D05EAF56-C8F0-4612-806C-93E1C27F1929}" dt="2024-01-25T12:08:02.278" v="316"/>
+      <pc:sldChg chg="addSp delSp modSp add mod">
+        <pc:chgData name="Ihor Aleksandrov" userId="c3051032-6b87-4db2-b257-777a0106fbd9" providerId="ADAL" clId="{D05EAF56-C8F0-4612-806C-93E1C27F1929}" dt="2024-01-26T13:44:03.207" v="415" actId="962"/>
         <pc:sldMkLst>
           <pc:docMk/>
           <pc:sldMk cId="4186553512" sldId="299"/>
@@ -1398,9 +1634,25 @@
             <ac:spMk id="2" creationId="{53C5D828-9666-E312-B574-9FE965A7D6BE}"/>
           </ac:spMkLst>
         </pc:spChg>
+        <pc:spChg chg="del">
+          <ac:chgData name="Ihor Aleksandrov" userId="c3051032-6b87-4db2-b257-777a0106fbd9" providerId="ADAL" clId="{D05EAF56-C8F0-4612-806C-93E1C27F1929}" dt="2024-01-26T13:43:58.652" v="411" actId="478"/>
+          <ac:spMkLst>
+            <pc:docMk/>
+            <pc:sldMk cId="4186553512" sldId="299"/>
+            <ac:spMk id="6" creationId="{E04F08BD-B70E-B1A8-7328-EE29B18E4AA1}"/>
+          </ac:spMkLst>
+        </pc:spChg>
+        <pc:picChg chg="add mod">
+          <ac:chgData name="Ihor Aleksandrov" userId="c3051032-6b87-4db2-b257-777a0106fbd9" providerId="ADAL" clId="{D05EAF56-C8F0-4612-806C-93E1C27F1929}" dt="2024-01-26T13:44:03.207" v="415" actId="962"/>
+          <ac:picMkLst>
+            <pc:docMk/>
+            <pc:sldMk cId="4186553512" sldId="299"/>
+            <ac:picMk id="5" creationId="{4530C90C-B940-4FB1-7CCB-6BBD2F58C875}"/>
+          </ac:picMkLst>
+        </pc:picChg>
       </pc:sldChg>
-      <pc:sldChg chg="modSp add mod">
-        <pc:chgData name="Ihor Aleksandrov" userId="c3051032-6b87-4db2-b257-777a0106fbd9" providerId="ADAL" clId="{D05EAF56-C8F0-4612-806C-93E1C27F1929}" dt="2024-01-25T12:09:53.445" v="318"/>
+      <pc:sldChg chg="addSp delSp modSp add mod">
+        <pc:chgData name="Ihor Aleksandrov" userId="c3051032-6b87-4db2-b257-777a0106fbd9" providerId="ADAL" clId="{D05EAF56-C8F0-4612-806C-93E1C27F1929}" dt="2024-01-26T13:44:09.013" v="420" actId="1076"/>
         <pc:sldMkLst>
           <pc:docMk/>
           <pc:sldMk cId="834159653" sldId="300"/>
@@ -1413,9 +1665,25 @@
             <ac:spMk id="2" creationId="{53C5D828-9666-E312-B574-9FE965A7D6BE}"/>
           </ac:spMkLst>
         </pc:spChg>
+        <pc:spChg chg="del">
+          <ac:chgData name="Ihor Aleksandrov" userId="c3051032-6b87-4db2-b257-777a0106fbd9" providerId="ADAL" clId="{D05EAF56-C8F0-4612-806C-93E1C27F1929}" dt="2024-01-26T13:44:06.141" v="416" actId="478"/>
+          <ac:spMkLst>
+            <pc:docMk/>
+            <pc:sldMk cId="834159653" sldId="300"/>
+            <ac:spMk id="6" creationId="{E04F08BD-B70E-B1A8-7328-EE29B18E4AA1}"/>
+          </ac:spMkLst>
+        </pc:spChg>
+        <pc:picChg chg="add mod">
+          <ac:chgData name="Ihor Aleksandrov" userId="c3051032-6b87-4db2-b257-777a0106fbd9" providerId="ADAL" clId="{D05EAF56-C8F0-4612-806C-93E1C27F1929}" dt="2024-01-26T13:44:09.013" v="420" actId="1076"/>
+          <ac:picMkLst>
+            <pc:docMk/>
+            <pc:sldMk cId="834159653" sldId="300"/>
+            <ac:picMk id="5" creationId="{E3FBA99F-8C18-85B9-0249-98AC2FBC3E84}"/>
+          </ac:picMkLst>
+        </pc:picChg>
       </pc:sldChg>
-      <pc:sldChg chg="modSp add mod">
-        <pc:chgData name="Ihor Aleksandrov" userId="c3051032-6b87-4db2-b257-777a0106fbd9" providerId="ADAL" clId="{D05EAF56-C8F0-4612-806C-93E1C27F1929}" dt="2024-01-25T12:10:57.045" v="321" actId="27636"/>
+      <pc:sldChg chg="addSp delSp modSp add mod">
+        <pc:chgData name="Ihor Aleksandrov" userId="c3051032-6b87-4db2-b257-777a0106fbd9" providerId="ADAL" clId="{D05EAF56-C8F0-4612-806C-93E1C27F1929}" dt="2024-01-26T13:44:16.814" v="425" actId="1076"/>
         <pc:sldMkLst>
           <pc:docMk/>
           <pc:sldMk cId="324410250" sldId="301"/>
@@ -1428,6 +1696,22 @@
             <ac:spMk id="2" creationId="{53C5D828-9666-E312-B574-9FE965A7D6BE}"/>
           </ac:spMkLst>
         </pc:spChg>
+        <pc:spChg chg="del">
+          <ac:chgData name="Ihor Aleksandrov" userId="c3051032-6b87-4db2-b257-777a0106fbd9" providerId="ADAL" clId="{D05EAF56-C8F0-4612-806C-93E1C27F1929}" dt="2024-01-26T13:44:13.917" v="424" actId="478"/>
+          <ac:spMkLst>
+            <pc:docMk/>
+            <pc:sldMk cId="324410250" sldId="301"/>
+            <ac:spMk id="6" creationId="{E04F08BD-B70E-B1A8-7328-EE29B18E4AA1}"/>
+          </ac:spMkLst>
+        </pc:spChg>
+        <pc:picChg chg="add mod">
+          <ac:chgData name="Ihor Aleksandrov" userId="c3051032-6b87-4db2-b257-777a0106fbd9" providerId="ADAL" clId="{D05EAF56-C8F0-4612-806C-93E1C27F1929}" dt="2024-01-26T13:44:16.814" v="425" actId="1076"/>
+          <ac:picMkLst>
+            <pc:docMk/>
+            <pc:sldMk cId="324410250" sldId="301"/>
+            <ac:picMk id="5" creationId="{A37A9516-F364-2AFA-3476-8348D5465658}"/>
+          </ac:picMkLst>
+        </pc:picChg>
       </pc:sldChg>
       <pc:sldChg chg="add">
         <pc:chgData name="Ihor Aleksandrov" userId="c3051032-6b87-4db2-b257-777a0106fbd9" providerId="ADAL" clId="{D05EAF56-C8F0-4612-806C-93E1C27F1929}" dt="2024-01-25T12:18:40.426" v="323"/>
@@ -4184,7 +4468,7 @@
           <a:p>
             <a:fld id="{14FB1113-EC1E-4052-ADC3-711A8186C8F9}" type="datetimeFigureOut">
               <a:rPr lang="ru-UA" smtClean="0"/>
-              <a:t>25.01.2024</a:t>
+              <a:t>26.01.2024</a:t>
             </a:fld>
             <a:endParaRPr lang="ru-UA"/>
           </a:p>
@@ -4601,7 +4885,7 @@
           <a:p>
             <a:fld id="{0B8962EF-F649-4BF0-B0CB-D71423952154}" type="datetime1">
               <a:rPr lang="ru-UA" smtClean="0"/>
-              <a:t>25.01.2024</a:t>
+              <a:t>26.01.2024</a:t>
             </a:fld>
             <a:endParaRPr lang="ru-UA"/>
           </a:p>
@@ -4805,7 +5089,7 @@
           <a:p>
             <a:fld id="{52B04991-4203-48C2-B120-290746D8BC41}" type="datetime1">
               <a:rPr lang="ru-UA" smtClean="0"/>
-              <a:t>25.01.2024</a:t>
+              <a:t>26.01.2024</a:t>
             </a:fld>
             <a:endParaRPr lang="ru-UA"/>
           </a:p>
@@ -5019,7 +5303,7 @@
           <a:p>
             <a:fld id="{207AB121-CB86-4DCF-9E3D-2A0553392796}" type="datetime1">
               <a:rPr lang="ru-UA" smtClean="0"/>
-              <a:t>25.01.2024</a:t>
+              <a:t>26.01.2024</a:t>
             </a:fld>
             <a:endParaRPr lang="ru-UA"/>
           </a:p>
@@ -5223,7 +5507,7 @@
           <a:p>
             <a:fld id="{8467C913-2051-48A1-86F2-D1DABB2E6F13}" type="datetime1">
               <a:rPr lang="ru-UA" smtClean="0"/>
-              <a:t>25.01.2024</a:t>
+              <a:t>26.01.2024</a:t>
             </a:fld>
             <a:endParaRPr lang="ru-UA"/>
           </a:p>
@@ -5449,7 +5733,7 @@
           <a:p>
             <a:fld id="{C75B975F-BA21-4E1C-99B6-ABED30F89540}" type="datetime1">
               <a:rPr lang="ru-UA" smtClean="0"/>
-              <a:t>25.01.2024</a:t>
+              <a:t>26.01.2024</a:t>
             </a:fld>
             <a:endParaRPr lang="ru-UA"/>
           </a:p>
@@ -5653,7 +5937,7 @@
           <a:p>
             <a:fld id="{649A85F2-FE43-4F23-9D2D-558360D289A8}" type="datetime1">
               <a:rPr lang="ru-UA" smtClean="0"/>
-              <a:t>25.01.2024</a:t>
+              <a:t>26.01.2024</a:t>
             </a:fld>
             <a:endParaRPr lang="ru-UA"/>
           </a:p>
@@ -5933,7 +6217,7 @@
           <a:p>
             <a:fld id="{3C823F1E-25D4-4C19-9C16-57D27B598CE0}" type="datetime1">
               <a:rPr lang="ru-UA" smtClean="0"/>
-              <a:t>25.01.2024</a:t>
+              <a:t>26.01.2024</a:t>
             </a:fld>
             <a:endParaRPr lang="ru-UA"/>
           </a:p>
@@ -6205,7 +6489,7 @@
           <a:p>
             <a:fld id="{0FCE2DAB-FCC6-443D-91B5-F43A7B78C6B9}" type="datetime1">
               <a:rPr lang="ru-UA" smtClean="0"/>
-              <a:t>25.01.2024</a:t>
+              <a:t>26.01.2024</a:t>
             </a:fld>
             <a:endParaRPr lang="ru-UA"/>
           </a:p>
@@ -6624,7 +6908,7 @@
           <a:p>
             <a:fld id="{B647925C-949E-4C3F-B87F-94A502A4557F}" type="datetime1">
               <a:rPr lang="ru-UA" smtClean="0"/>
-              <a:t>25.01.2024</a:t>
+              <a:t>26.01.2024</a:t>
             </a:fld>
             <a:endParaRPr lang="ru-UA"/>
           </a:p>
@@ -6770,7 +7054,7 @@
           <a:p>
             <a:fld id="{9CE8CD01-0F29-4954-897C-1CC212183DBB}" type="datetime1">
               <a:rPr lang="ru-UA" smtClean="0"/>
-              <a:t>25.01.2024</a:t>
+              <a:t>26.01.2024</a:t>
             </a:fld>
             <a:endParaRPr lang="ru-UA"/>
           </a:p>
@@ -6887,7 +7171,7 @@
           <a:p>
             <a:fld id="{150095DC-0E76-47E5-A99D-2467BE30280E}" type="datetime1">
               <a:rPr lang="ru-UA" smtClean="0"/>
-              <a:t>25.01.2024</a:t>
+              <a:t>26.01.2024</a:t>
             </a:fld>
             <a:endParaRPr lang="ru-UA"/>
           </a:p>
@@ -7204,7 +7488,7 @@
           <a:p>
             <a:fld id="{CC7126BF-809C-4659-95F5-CCF148063973}" type="datetime1">
               <a:rPr lang="ru-UA" smtClean="0"/>
-              <a:t>25.01.2024</a:t>
+              <a:t>26.01.2024</a:t>
             </a:fld>
             <a:endParaRPr lang="ru-UA"/>
           </a:p>
@@ -7497,7 +7781,7 @@
           <a:p>
             <a:fld id="{D2EFC65D-56A3-455E-BFA5-3848A656380B}" type="datetime1">
               <a:rPr lang="ru-UA" smtClean="0"/>
-              <a:t>25.01.2024</a:t>
+              <a:t>26.01.2024</a:t>
             </a:fld>
             <a:endParaRPr lang="ru-UA"/>
           </a:p>
@@ -7744,7 +8028,7 @@
           <a:p>
             <a:fld id="{5E1B79E6-2B08-45F0-89F7-F914E581FDE2}" type="datetime1">
               <a:rPr lang="ru-UA" smtClean="0"/>
-              <a:t>25.01.2024</a:t>
+              <a:t>26.01.2024</a:t>
             </a:fld>
             <a:endParaRPr lang="ru-UA"/>
           </a:p>
@@ -8319,7 +8603,7 @@
           <a:p>
             <a:fld id="{50344D1B-5235-486F-A999-CD74520911B6}" type="datetime1">
               <a:rPr lang="ru-UA" smtClean="0"/>
-              <a:t>25.01.2024</a:t>
+              <a:t>26.01.2024</a:t>
             </a:fld>
             <a:endParaRPr lang="ru-UA"/>
           </a:p>
@@ -11211,86 +11495,70 @@
                 <a:ea typeface="+mj-ea"/>
                 <a:cs typeface="+mj-cs"/>
               </a:rPr>
-              <a:t>What’s DevOps?</a:t>
+              <a:t>Why DevOps?</a:t>
             </a:r>
           </a:p>
         </p:txBody>
       </p:sp>
       <p:sp>
         <p:nvSpPr>
-          <p:cNvPr id="3" name="Rectangle 2">
-            <a:extLst>
-              <a:ext uri="{FF2B5EF4-FFF2-40B4-BE49-F238E27FC236}">
-                <a16:creationId xmlns:a16="http://schemas.microsoft.com/office/drawing/2014/main" id="{F79F3174-C140-0248-35F5-C80A867261E7}"/>
-              </a:ext>
-            </a:extLst>
-          </p:cNvPr>
-          <p:cNvSpPr/>
+          <p:cNvPr id="4" name="Footer Placeholder 3">
+            <a:extLst>
+              <a:ext uri="{FF2B5EF4-FFF2-40B4-BE49-F238E27FC236}">
+                <a16:creationId xmlns:a16="http://schemas.microsoft.com/office/drawing/2014/main" id="{ADFF8568-DBE3-6323-E204-CE7FBE7F8761}"/>
+              </a:ext>
+            </a:extLst>
+          </p:cNvPr>
+          <p:cNvSpPr>
+            <a:spLocks noGrp="1"/>
+          </p:cNvSpPr>
+          <p:nvPr>
+            <p:ph type="ftr" sz="quarter" idx="11"/>
+          </p:nvPr>
+        </p:nvSpPr>
+        <p:spPr/>
+        <p:txBody>
+          <a:bodyPr/>
+          <a:lstStyle/>
+          <a:p>
+            <a:r>
+              <a:rPr lang="es-ES"/>
+              <a:t>Step 1 - Model - ver. 1</a:t>
+            </a:r>
+            <a:endParaRPr lang="ru-UA"/>
+          </a:p>
+        </p:txBody>
+      </p:sp>
+      <p:pic>
+        <p:nvPicPr>
+          <p:cNvPr id="5" name="Picture 4">
+            <a:extLst>
+              <a:ext uri="{FF2B5EF4-FFF2-40B4-BE49-F238E27FC236}">
+                <a16:creationId xmlns:a16="http://schemas.microsoft.com/office/drawing/2014/main" id="{647C4A66-CC34-41A1-6251-F783DFA58E4F}"/>
+              </a:ext>
+            </a:extLst>
+          </p:cNvPr>
+          <p:cNvPicPr>
+            <a:picLocks noChangeAspect="1"/>
+          </p:cNvPicPr>
           <p:nvPr/>
-        </p:nvSpPr>
+        </p:nvPicPr>
+        <p:blipFill>
+          <a:blip r:embed="rId2"/>
+          <a:stretch>
+            <a:fillRect/>
+          </a:stretch>
+        </p:blipFill>
         <p:spPr>
           <a:xfrm>
-            <a:off x="4724400" y="1301258"/>
-            <a:ext cx="6750178" cy="3879272"/>
+            <a:off x="4585806" y="1308294"/>
+            <a:ext cx="6779340" cy="3865199"/>
           </a:xfrm>
           <a:prstGeom prst="rect">
             <a:avLst/>
           </a:prstGeom>
         </p:spPr>
-        <p:style>
-          <a:lnRef idx="2">
-            <a:schemeClr val="accent1">
-              <a:shade val="15000"/>
-            </a:schemeClr>
-          </a:lnRef>
-          <a:fillRef idx="1">
-            <a:schemeClr val="accent1"/>
-          </a:fillRef>
-          <a:effectRef idx="0">
-            <a:schemeClr val="accent1"/>
-          </a:effectRef>
-          <a:fontRef idx="minor">
-            <a:schemeClr val="lt1"/>
-          </a:fontRef>
-        </p:style>
-        <p:txBody>
-          <a:bodyPr rtlCol="0" anchor="ctr"/>
-          <a:lstStyle/>
-          <a:p>
-            <a:pPr algn="ctr"/>
-            <a:endParaRPr lang="ru-UA"/>
-          </a:p>
-        </p:txBody>
-      </p:sp>
-      <p:sp>
-        <p:nvSpPr>
-          <p:cNvPr id="4" name="Footer Placeholder 3">
-            <a:extLst>
-              <a:ext uri="{FF2B5EF4-FFF2-40B4-BE49-F238E27FC236}">
-                <a16:creationId xmlns:a16="http://schemas.microsoft.com/office/drawing/2014/main" id="{ADFF8568-DBE3-6323-E204-CE7FBE7F8761}"/>
-              </a:ext>
-            </a:extLst>
-          </p:cNvPr>
-          <p:cNvSpPr>
-            <a:spLocks noGrp="1"/>
-          </p:cNvSpPr>
-          <p:nvPr>
-            <p:ph type="ftr" sz="quarter" idx="11"/>
-          </p:nvPr>
-        </p:nvSpPr>
-        <p:spPr/>
-        <p:txBody>
-          <a:bodyPr/>
-          <a:lstStyle/>
-          <a:p>
-            <a:r>
-              <a:rPr lang="es-ES"/>
-              <a:t>Step 1 - Model - ver. 1</a:t>
-            </a:r>
-            <a:endParaRPr lang="ru-UA"/>
-          </a:p>
-        </p:txBody>
-      </p:sp>
+      </p:pic>
     </p:spTree>
     <p:extLst>
       <p:ext uri="{BB962C8B-B14F-4D97-AF65-F5344CB8AC3E}">
@@ -13111,79 +13379,71 @@
       </p:sp>
       <p:sp>
         <p:nvSpPr>
-          <p:cNvPr id="6" name="Rectangle 5">
-            <a:extLst>
-              <a:ext uri="{FF2B5EF4-FFF2-40B4-BE49-F238E27FC236}">
-                <a16:creationId xmlns:a16="http://schemas.microsoft.com/office/drawing/2014/main" id="{E04F08BD-B70E-B1A8-7328-EE29B18E4AA1}"/>
-              </a:ext>
-            </a:extLst>
-          </p:cNvPr>
-          <p:cNvSpPr/>
+          <p:cNvPr id="3" name="Footer Placeholder 2">
+            <a:extLst>
+              <a:ext uri="{FF2B5EF4-FFF2-40B4-BE49-F238E27FC236}">
+                <a16:creationId xmlns:a16="http://schemas.microsoft.com/office/drawing/2014/main" id="{754E75A3-56B9-C5B7-DA44-51667BD4A425}"/>
+              </a:ext>
+            </a:extLst>
+          </p:cNvPr>
+          <p:cNvSpPr>
+            <a:spLocks noGrp="1"/>
+          </p:cNvSpPr>
+          <p:nvPr>
+            <p:ph type="ftr" sz="quarter" idx="11"/>
+          </p:nvPr>
+        </p:nvSpPr>
+        <p:spPr/>
+        <p:txBody>
+          <a:bodyPr/>
+          <a:lstStyle/>
+          <a:p>
+            <a:r>
+              <a:rPr lang="es-ES"/>
+              <a:t>Step 1 - Model - ver. 1</a:t>
+            </a:r>
+            <a:endParaRPr lang="ru-UA"/>
+          </a:p>
+        </p:txBody>
+      </p:sp>
+      <p:pic>
+        <p:nvPicPr>
+          <p:cNvPr id="8" name="Picture 7">
+            <a:extLst>
+              <a:ext uri="{FF2B5EF4-FFF2-40B4-BE49-F238E27FC236}">
+                <a16:creationId xmlns:a16="http://schemas.microsoft.com/office/drawing/2014/main" id="{5E021E4D-8FA0-4660-5BEF-76686E057B60}"/>
+              </a:ext>
+            </a:extLst>
+          </p:cNvPr>
+          <p:cNvPicPr>
+            <a:picLocks noChangeAspect="1"/>
+          </p:cNvPicPr>
           <p:nvPr/>
-        </p:nvSpPr>
+        </p:nvPicPr>
+        <p:blipFill>
+          <a:blip r:embed="rId2">
+            <a:duotone>
+              <a:schemeClr val="accent6">
+                <a:shade val="45000"/>
+                <a:satMod val="135000"/>
+              </a:schemeClr>
+              <a:prstClr val="white"/>
+            </a:duotone>
+          </a:blip>
+          <a:stretch>
+            <a:fillRect/>
+          </a:stretch>
+        </p:blipFill>
         <p:spPr>
           <a:xfrm>
-            <a:off x="5669280" y="1574019"/>
-            <a:ext cx="4728754" cy="3333750"/>
+            <a:off x="6434922" y="1574019"/>
+            <a:ext cx="3081108" cy="3081108"/>
           </a:xfrm>
           <a:prstGeom prst="rect">
             <a:avLst/>
           </a:prstGeom>
         </p:spPr>
-        <p:style>
-          <a:lnRef idx="2">
-            <a:schemeClr val="accent1">
-              <a:shade val="15000"/>
-            </a:schemeClr>
-          </a:lnRef>
-          <a:fillRef idx="1">
-            <a:schemeClr val="accent1"/>
-          </a:fillRef>
-          <a:effectRef idx="0">
-            <a:schemeClr val="accent1"/>
-          </a:effectRef>
-          <a:fontRef idx="minor">
-            <a:schemeClr val="lt1"/>
-          </a:fontRef>
-        </p:style>
-        <p:txBody>
-          <a:bodyPr rtlCol="0" anchor="ctr"/>
-          <a:lstStyle/>
-          <a:p>
-            <a:pPr algn="ctr"/>
-            <a:endParaRPr lang="ru-UA"/>
-          </a:p>
-        </p:txBody>
-      </p:sp>
-      <p:sp>
-        <p:nvSpPr>
-          <p:cNvPr id="3" name="Footer Placeholder 2">
-            <a:extLst>
-              <a:ext uri="{FF2B5EF4-FFF2-40B4-BE49-F238E27FC236}">
-                <a16:creationId xmlns:a16="http://schemas.microsoft.com/office/drawing/2014/main" id="{754E75A3-56B9-C5B7-DA44-51667BD4A425}"/>
-              </a:ext>
-            </a:extLst>
-          </p:cNvPr>
-          <p:cNvSpPr>
-            <a:spLocks noGrp="1"/>
-          </p:cNvSpPr>
-          <p:nvPr>
-            <p:ph type="ftr" sz="quarter" idx="11"/>
-          </p:nvPr>
-        </p:nvSpPr>
-        <p:spPr/>
-        <p:txBody>
-          <a:bodyPr/>
-          <a:lstStyle/>
-          <a:p>
-            <a:r>
-              <a:rPr lang="es-ES"/>
-              <a:t>Step 1 - Model - ver. 1</a:t>
-            </a:r>
-            <a:endParaRPr lang="ru-UA"/>
-          </a:p>
-        </p:txBody>
-      </p:sp>
+      </p:pic>
     </p:spTree>
     <p:extLst>
       <p:ext uri="{BB962C8B-B14F-4D97-AF65-F5344CB8AC3E}">
@@ -13334,79 +13594,82 @@
       </p:sp>
       <p:sp>
         <p:nvSpPr>
-          <p:cNvPr id="6" name="Rectangle 5">
-            <a:extLst>
-              <a:ext uri="{FF2B5EF4-FFF2-40B4-BE49-F238E27FC236}">
-                <a16:creationId xmlns:a16="http://schemas.microsoft.com/office/drawing/2014/main" id="{E04F08BD-B70E-B1A8-7328-EE29B18E4AA1}"/>
-              </a:ext>
-            </a:extLst>
-          </p:cNvPr>
-          <p:cNvSpPr/>
+          <p:cNvPr id="3" name="Footer Placeholder 2">
+            <a:extLst>
+              <a:ext uri="{FF2B5EF4-FFF2-40B4-BE49-F238E27FC236}">
+                <a16:creationId xmlns:a16="http://schemas.microsoft.com/office/drawing/2014/main" id="{76104783-4055-4469-A4B0-26C1AFE8E1B7}"/>
+              </a:ext>
+            </a:extLst>
+          </p:cNvPr>
+          <p:cNvSpPr>
+            <a:spLocks noGrp="1"/>
+          </p:cNvSpPr>
+          <p:nvPr>
+            <p:ph type="ftr" sz="quarter" idx="11"/>
+          </p:nvPr>
+        </p:nvSpPr>
+        <p:spPr/>
+        <p:txBody>
+          <a:bodyPr/>
+          <a:lstStyle/>
+          <a:p>
+            <a:r>
+              <a:rPr lang="es-ES"/>
+              <a:t>Step 1 - Model - ver. 1</a:t>
+            </a:r>
+            <a:endParaRPr lang="ru-UA"/>
+          </a:p>
+        </p:txBody>
+      </p:sp>
+      <p:pic>
+        <p:nvPicPr>
+          <p:cNvPr id="5" name="Picture 4">
+            <a:extLst>
+              <a:ext uri="{FF2B5EF4-FFF2-40B4-BE49-F238E27FC236}">
+                <a16:creationId xmlns:a16="http://schemas.microsoft.com/office/drawing/2014/main" id="{5569BDEA-DAC2-A509-CC95-A1A1249837C8}"/>
+              </a:ext>
+            </a:extLst>
+          </p:cNvPr>
+          <p:cNvPicPr>
+            <a:picLocks noChangeAspect="1"/>
+          </p:cNvPicPr>
           <p:nvPr/>
-        </p:nvSpPr>
+        </p:nvPicPr>
+        <p:blipFill>
+          <a:blip r:embed="rId2">
+            <a:duotone>
+              <a:schemeClr val="accent6">
+                <a:shade val="45000"/>
+                <a:satMod val="135000"/>
+              </a:schemeClr>
+              <a:prstClr val="white"/>
+            </a:duotone>
+            <a:extLst>
+              <a:ext uri="{BEBA8EAE-BF5A-486C-A8C5-ECC9F3942E4B}">
+                <a14:imgProps xmlns:a14="http://schemas.microsoft.com/office/drawing/2010/main">
+                  <a14:imgLayer r:embed="rId3">
+                    <a14:imgEffect>
+                      <a14:brightnessContrast bright="20000" contrast="-40000"/>
+                    </a14:imgEffect>
+                  </a14:imgLayer>
+                </a14:imgProps>
+              </a:ext>
+            </a:extLst>
+          </a:blip>
+          <a:stretch>
+            <a:fillRect/>
+          </a:stretch>
+        </p:blipFill>
         <p:spPr>
           <a:xfrm>
-            <a:off x="5669280" y="1574019"/>
-            <a:ext cx="4728754" cy="3333750"/>
+            <a:off x="6248229" y="1072357"/>
+            <a:ext cx="4405915" cy="4337073"/>
           </a:xfrm>
           <a:prstGeom prst="rect">
             <a:avLst/>
           </a:prstGeom>
         </p:spPr>
-        <p:style>
-          <a:lnRef idx="2">
-            <a:schemeClr val="accent1">
-              <a:shade val="15000"/>
-            </a:schemeClr>
-          </a:lnRef>
-          <a:fillRef idx="1">
-            <a:schemeClr val="accent1"/>
-          </a:fillRef>
-          <a:effectRef idx="0">
-            <a:schemeClr val="accent1"/>
-          </a:effectRef>
-          <a:fontRef idx="minor">
-            <a:schemeClr val="lt1"/>
-          </a:fontRef>
-        </p:style>
-        <p:txBody>
-          <a:bodyPr rtlCol="0" anchor="ctr"/>
-          <a:lstStyle/>
-          <a:p>
-            <a:pPr algn="ctr"/>
-            <a:endParaRPr lang="ru-UA"/>
-          </a:p>
-        </p:txBody>
-      </p:sp>
-      <p:sp>
-        <p:nvSpPr>
-          <p:cNvPr id="3" name="Footer Placeholder 2">
-            <a:extLst>
-              <a:ext uri="{FF2B5EF4-FFF2-40B4-BE49-F238E27FC236}">
-                <a16:creationId xmlns:a16="http://schemas.microsoft.com/office/drawing/2014/main" id="{76104783-4055-4469-A4B0-26C1AFE8E1B7}"/>
-              </a:ext>
-            </a:extLst>
-          </p:cNvPr>
-          <p:cNvSpPr>
-            <a:spLocks noGrp="1"/>
-          </p:cNvSpPr>
-          <p:nvPr>
-            <p:ph type="ftr" sz="quarter" idx="11"/>
-          </p:nvPr>
-        </p:nvSpPr>
-        <p:spPr/>
-        <p:txBody>
-          <a:bodyPr/>
-          <a:lstStyle/>
-          <a:p>
-            <a:r>
-              <a:rPr lang="es-ES"/>
-              <a:t>Step 1 - Model - ver. 1</a:t>
-            </a:r>
-            <a:endParaRPr lang="ru-UA"/>
-          </a:p>
-        </p:txBody>
-      </p:sp>
+      </p:pic>
     </p:spTree>
     <p:extLst>
       <p:ext uri="{BB962C8B-B14F-4D97-AF65-F5344CB8AC3E}">
@@ -13557,79 +13820,82 @@
       </p:sp>
       <p:sp>
         <p:nvSpPr>
-          <p:cNvPr id="6" name="Rectangle 5">
-            <a:extLst>
-              <a:ext uri="{FF2B5EF4-FFF2-40B4-BE49-F238E27FC236}">
-                <a16:creationId xmlns:a16="http://schemas.microsoft.com/office/drawing/2014/main" id="{E04F08BD-B70E-B1A8-7328-EE29B18E4AA1}"/>
-              </a:ext>
-            </a:extLst>
-          </p:cNvPr>
-          <p:cNvSpPr/>
+          <p:cNvPr id="3" name="Footer Placeholder 2">
+            <a:extLst>
+              <a:ext uri="{FF2B5EF4-FFF2-40B4-BE49-F238E27FC236}">
+                <a16:creationId xmlns:a16="http://schemas.microsoft.com/office/drawing/2014/main" id="{1036EAC4-6DDE-DD5B-3CF9-C5CD859E6DC2}"/>
+              </a:ext>
+            </a:extLst>
+          </p:cNvPr>
+          <p:cNvSpPr>
+            <a:spLocks noGrp="1"/>
+          </p:cNvSpPr>
+          <p:nvPr>
+            <p:ph type="ftr" sz="quarter" idx="11"/>
+          </p:nvPr>
+        </p:nvSpPr>
+        <p:spPr/>
+        <p:txBody>
+          <a:bodyPr/>
+          <a:lstStyle/>
+          <a:p>
+            <a:r>
+              <a:rPr lang="es-ES"/>
+              <a:t>Step 1 - Model - ver. 1</a:t>
+            </a:r>
+            <a:endParaRPr lang="ru-UA"/>
+          </a:p>
+        </p:txBody>
+      </p:sp>
+      <p:pic>
+        <p:nvPicPr>
+          <p:cNvPr id="5" name="Picture 4">
+            <a:extLst>
+              <a:ext uri="{FF2B5EF4-FFF2-40B4-BE49-F238E27FC236}">
+                <a16:creationId xmlns:a16="http://schemas.microsoft.com/office/drawing/2014/main" id="{5371BBC4-E1E6-52BC-8A5F-ED6DCBF94F0F}"/>
+              </a:ext>
+            </a:extLst>
+          </p:cNvPr>
+          <p:cNvPicPr>
+            <a:picLocks noChangeAspect="1"/>
+          </p:cNvPicPr>
           <p:nvPr/>
-        </p:nvSpPr>
+        </p:nvPicPr>
+        <p:blipFill>
+          <a:blip r:embed="rId2">
+            <a:duotone>
+              <a:schemeClr val="accent6">
+                <a:shade val="45000"/>
+                <a:satMod val="135000"/>
+              </a:schemeClr>
+              <a:prstClr val="white"/>
+            </a:duotone>
+            <a:extLst>
+              <a:ext uri="{BEBA8EAE-BF5A-486C-A8C5-ECC9F3942E4B}">
+                <a14:imgProps xmlns:a14="http://schemas.microsoft.com/office/drawing/2010/main">
+                  <a14:imgLayer r:embed="rId3">
+                    <a14:imgEffect>
+                      <a14:brightnessContrast bright="20000" contrast="-40000"/>
+                    </a14:imgEffect>
+                  </a14:imgLayer>
+                </a14:imgProps>
+              </a:ext>
+            </a:extLst>
+          </a:blip>
+          <a:stretch>
+            <a:fillRect/>
+          </a:stretch>
+        </p:blipFill>
         <p:spPr>
           <a:xfrm>
-            <a:off x="5669280" y="1574019"/>
-            <a:ext cx="4728754" cy="3333750"/>
+            <a:off x="5980625" y="1101432"/>
+            <a:ext cx="4728938" cy="4510679"/>
           </a:xfrm>
           <a:prstGeom prst="rect">
             <a:avLst/>
           </a:prstGeom>
         </p:spPr>
-        <p:style>
-          <a:lnRef idx="2">
-            <a:schemeClr val="accent1">
-              <a:shade val="15000"/>
-            </a:schemeClr>
-          </a:lnRef>
-          <a:fillRef idx="1">
-            <a:schemeClr val="accent1"/>
-          </a:fillRef>
-          <a:effectRef idx="0">
-            <a:schemeClr val="accent1"/>
-          </a:effectRef>
-          <a:fontRef idx="minor">
-            <a:schemeClr val="lt1"/>
-          </a:fontRef>
-        </p:style>
-        <p:txBody>
-          <a:bodyPr rtlCol="0" anchor="ctr"/>
-          <a:lstStyle/>
-          <a:p>
-            <a:pPr algn="ctr"/>
-            <a:endParaRPr lang="ru-UA"/>
-          </a:p>
-        </p:txBody>
-      </p:sp>
-      <p:sp>
-        <p:nvSpPr>
-          <p:cNvPr id="3" name="Footer Placeholder 2">
-            <a:extLst>
-              <a:ext uri="{FF2B5EF4-FFF2-40B4-BE49-F238E27FC236}">
-                <a16:creationId xmlns:a16="http://schemas.microsoft.com/office/drawing/2014/main" id="{1036EAC4-6DDE-DD5B-3CF9-C5CD859E6DC2}"/>
-              </a:ext>
-            </a:extLst>
-          </p:cNvPr>
-          <p:cNvSpPr>
-            <a:spLocks noGrp="1"/>
-          </p:cNvSpPr>
-          <p:nvPr>
-            <p:ph type="ftr" sz="quarter" idx="11"/>
-          </p:nvPr>
-        </p:nvSpPr>
-        <p:spPr/>
-        <p:txBody>
-          <a:bodyPr/>
-          <a:lstStyle/>
-          <a:p>
-            <a:r>
-              <a:rPr lang="es-ES"/>
-              <a:t>Step 1 - Model - ver. 1</a:t>
-            </a:r>
-            <a:endParaRPr lang="ru-UA"/>
-          </a:p>
-        </p:txBody>
-      </p:sp>
+      </p:pic>
     </p:spTree>
     <p:extLst>
       <p:ext uri="{BB962C8B-B14F-4D97-AF65-F5344CB8AC3E}">
@@ -14354,79 +14620,69 @@
       </p:sp>
       <p:sp>
         <p:nvSpPr>
-          <p:cNvPr id="6" name="Rectangle 5">
-            <a:extLst>
-              <a:ext uri="{FF2B5EF4-FFF2-40B4-BE49-F238E27FC236}">
-                <a16:creationId xmlns:a16="http://schemas.microsoft.com/office/drawing/2014/main" id="{E04F08BD-B70E-B1A8-7328-EE29B18E4AA1}"/>
-              </a:ext>
-            </a:extLst>
-          </p:cNvPr>
-          <p:cNvSpPr/>
+          <p:cNvPr id="3" name="Footer Placeholder 2">
+            <a:extLst>
+              <a:ext uri="{FF2B5EF4-FFF2-40B4-BE49-F238E27FC236}">
+                <a16:creationId xmlns:a16="http://schemas.microsoft.com/office/drawing/2014/main" id="{1036EAC4-6DDE-DD5B-3CF9-C5CD859E6DC2}"/>
+              </a:ext>
+            </a:extLst>
+          </p:cNvPr>
+          <p:cNvSpPr>
+            <a:spLocks noGrp="1"/>
+          </p:cNvSpPr>
+          <p:nvPr>
+            <p:ph type="ftr" sz="quarter" idx="11"/>
+          </p:nvPr>
+        </p:nvSpPr>
+        <p:spPr/>
+        <p:txBody>
+          <a:bodyPr/>
+          <a:lstStyle/>
+          <a:p>
+            <a:r>
+              <a:rPr lang="es-ES"/>
+              <a:t>Step 1 - Model - ver. 1</a:t>
+            </a:r>
+            <a:endParaRPr lang="ru-UA"/>
+          </a:p>
+        </p:txBody>
+      </p:sp>
+      <p:pic>
+        <p:nvPicPr>
+          <p:cNvPr id="5" name="Picture 4" descr="A diagram of a process&#10;&#10;Description automatically generated">
+            <a:extLst>
+              <a:ext uri="{FF2B5EF4-FFF2-40B4-BE49-F238E27FC236}">
+                <a16:creationId xmlns:a16="http://schemas.microsoft.com/office/drawing/2014/main" id="{639E5029-74DB-1BE3-178A-EFC0C60D5B22}"/>
+              </a:ext>
+            </a:extLst>
+          </p:cNvPr>
+          <p:cNvPicPr>
+            <a:picLocks noChangeAspect="1"/>
+          </p:cNvPicPr>
           <p:nvPr/>
-        </p:nvSpPr>
+        </p:nvPicPr>
+        <p:blipFill>
+          <a:blip r:embed="rId2">
+            <a:extLst>
+              <a:ext uri="{28A0092B-C50C-407E-A947-70E740481C1C}">
+                <a14:useLocalDpi xmlns:a14="http://schemas.microsoft.com/office/drawing/2010/main" val="0"/>
+              </a:ext>
+            </a:extLst>
+          </a:blip>
+          <a:stretch>
+            <a:fillRect/>
+          </a:stretch>
+        </p:blipFill>
         <p:spPr>
           <a:xfrm>
-            <a:off x="5669280" y="1574019"/>
-            <a:ext cx="4728754" cy="3333750"/>
+            <a:off x="3884558" y="1117023"/>
+            <a:ext cx="7990610" cy="3995305"/>
           </a:xfrm>
           <a:prstGeom prst="rect">
             <a:avLst/>
           </a:prstGeom>
         </p:spPr>
-        <p:style>
-          <a:lnRef idx="2">
-            <a:schemeClr val="accent1">
-              <a:shade val="15000"/>
-            </a:schemeClr>
-          </a:lnRef>
-          <a:fillRef idx="1">
-            <a:schemeClr val="accent1"/>
-          </a:fillRef>
-          <a:effectRef idx="0">
-            <a:schemeClr val="accent1"/>
-          </a:effectRef>
-          <a:fontRef idx="minor">
-            <a:schemeClr val="lt1"/>
-          </a:fontRef>
-        </p:style>
-        <p:txBody>
-          <a:bodyPr rtlCol="0" anchor="ctr"/>
-          <a:lstStyle/>
-          <a:p>
-            <a:pPr algn="ctr"/>
-            <a:endParaRPr lang="ru-UA"/>
-          </a:p>
-        </p:txBody>
-      </p:sp>
-      <p:sp>
-        <p:nvSpPr>
-          <p:cNvPr id="3" name="Footer Placeholder 2">
-            <a:extLst>
-              <a:ext uri="{FF2B5EF4-FFF2-40B4-BE49-F238E27FC236}">
-                <a16:creationId xmlns:a16="http://schemas.microsoft.com/office/drawing/2014/main" id="{1036EAC4-6DDE-DD5B-3CF9-C5CD859E6DC2}"/>
-              </a:ext>
-            </a:extLst>
-          </p:cNvPr>
-          <p:cNvSpPr>
-            <a:spLocks noGrp="1"/>
-          </p:cNvSpPr>
-          <p:nvPr>
-            <p:ph type="ftr" sz="quarter" idx="11"/>
-          </p:nvPr>
-        </p:nvSpPr>
-        <p:spPr/>
-        <p:txBody>
-          <a:bodyPr/>
-          <a:lstStyle/>
-          <a:p>
-            <a:r>
-              <a:rPr lang="es-ES"/>
-              <a:t>Step 1 - Model - ver. 1</a:t>
-            </a:r>
-            <a:endParaRPr lang="ru-UA"/>
-          </a:p>
-        </p:txBody>
-      </p:sp>
+      </p:pic>
     </p:spTree>
     <p:extLst>
       <p:ext uri="{BB962C8B-B14F-4D97-AF65-F5344CB8AC3E}">
@@ -14991,79 +15247,63 @@
       </p:sp>
       <p:sp>
         <p:nvSpPr>
-          <p:cNvPr id="6" name="Rectangle 5">
-            <a:extLst>
-              <a:ext uri="{FF2B5EF4-FFF2-40B4-BE49-F238E27FC236}">
-                <a16:creationId xmlns:a16="http://schemas.microsoft.com/office/drawing/2014/main" id="{E04F08BD-B70E-B1A8-7328-EE29B18E4AA1}"/>
-              </a:ext>
-            </a:extLst>
-          </p:cNvPr>
-          <p:cNvSpPr/>
+          <p:cNvPr id="3" name="Footer Placeholder 2">
+            <a:extLst>
+              <a:ext uri="{FF2B5EF4-FFF2-40B4-BE49-F238E27FC236}">
+                <a16:creationId xmlns:a16="http://schemas.microsoft.com/office/drawing/2014/main" id="{1036EAC4-6DDE-DD5B-3CF9-C5CD859E6DC2}"/>
+              </a:ext>
+            </a:extLst>
+          </p:cNvPr>
+          <p:cNvSpPr>
+            <a:spLocks noGrp="1"/>
+          </p:cNvSpPr>
+          <p:nvPr>
+            <p:ph type="ftr" sz="quarter" idx="11"/>
+          </p:nvPr>
+        </p:nvSpPr>
+        <p:spPr/>
+        <p:txBody>
+          <a:bodyPr/>
+          <a:lstStyle/>
+          <a:p>
+            <a:r>
+              <a:rPr lang="es-ES"/>
+              <a:t>Step 1 - Model - ver. 1</a:t>
+            </a:r>
+            <a:endParaRPr lang="ru-UA"/>
+          </a:p>
+        </p:txBody>
+      </p:sp>
+      <p:pic>
+        <p:nvPicPr>
+          <p:cNvPr id="5" name="Picture 4">
+            <a:extLst>
+              <a:ext uri="{FF2B5EF4-FFF2-40B4-BE49-F238E27FC236}">
+                <a16:creationId xmlns:a16="http://schemas.microsoft.com/office/drawing/2014/main" id="{76DCE5B1-23CA-917E-991B-373BB3E033F8}"/>
+              </a:ext>
+            </a:extLst>
+          </p:cNvPr>
+          <p:cNvPicPr>
+            <a:picLocks noChangeAspect="1"/>
+          </p:cNvPicPr>
           <p:nvPr/>
-        </p:nvSpPr>
+        </p:nvPicPr>
+        <p:blipFill>
+          <a:blip r:embed="rId2"/>
+          <a:stretch>
+            <a:fillRect/>
+          </a:stretch>
+        </p:blipFill>
         <p:spPr>
           <a:xfrm>
-            <a:off x="5669280" y="1574019"/>
-            <a:ext cx="4728754" cy="3333750"/>
+            <a:off x="4561410" y="1574019"/>
+            <a:ext cx="6913168" cy="3348701"/>
           </a:xfrm>
           <a:prstGeom prst="rect">
             <a:avLst/>
           </a:prstGeom>
         </p:spPr>
-        <p:style>
-          <a:lnRef idx="2">
-            <a:schemeClr val="accent1">
-              <a:shade val="15000"/>
-            </a:schemeClr>
-          </a:lnRef>
-          <a:fillRef idx="1">
-            <a:schemeClr val="accent1"/>
-          </a:fillRef>
-          <a:effectRef idx="0">
-            <a:schemeClr val="accent1"/>
-          </a:effectRef>
-          <a:fontRef idx="minor">
-            <a:schemeClr val="lt1"/>
-          </a:fontRef>
-        </p:style>
-        <p:txBody>
-          <a:bodyPr rtlCol="0" anchor="ctr"/>
-          <a:lstStyle/>
-          <a:p>
-            <a:pPr algn="ctr"/>
-            <a:endParaRPr lang="ru-UA"/>
-          </a:p>
-        </p:txBody>
-      </p:sp>
-      <p:sp>
-        <p:nvSpPr>
-          <p:cNvPr id="3" name="Footer Placeholder 2">
-            <a:extLst>
-              <a:ext uri="{FF2B5EF4-FFF2-40B4-BE49-F238E27FC236}">
-                <a16:creationId xmlns:a16="http://schemas.microsoft.com/office/drawing/2014/main" id="{1036EAC4-6DDE-DD5B-3CF9-C5CD859E6DC2}"/>
-              </a:ext>
-            </a:extLst>
-          </p:cNvPr>
-          <p:cNvSpPr>
-            <a:spLocks noGrp="1"/>
-          </p:cNvSpPr>
-          <p:nvPr>
-            <p:ph type="ftr" sz="quarter" idx="11"/>
-          </p:nvPr>
-        </p:nvSpPr>
-        <p:spPr/>
-        <p:txBody>
-          <a:bodyPr/>
-          <a:lstStyle/>
-          <a:p>
-            <a:r>
-              <a:rPr lang="es-ES"/>
-              <a:t>Step 1 - Model - ver. 1</a:t>
-            </a:r>
-            <a:endParaRPr lang="ru-UA"/>
-          </a:p>
-        </p:txBody>
-      </p:sp>
+      </p:pic>
     </p:spTree>
     <p:extLst>
       <p:ext uri="{BB962C8B-B14F-4D97-AF65-F5344CB8AC3E}">
@@ -16154,79 +16394,63 @@
       </p:sp>
       <p:sp>
         <p:nvSpPr>
-          <p:cNvPr id="6" name="Rectangle 5">
-            <a:extLst>
-              <a:ext uri="{FF2B5EF4-FFF2-40B4-BE49-F238E27FC236}">
-                <a16:creationId xmlns:a16="http://schemas.microsoft.com/office/drawing/2014/main" id="{E04F08BD-B70E-B1A8-7328-EE29B18E4AA1}"/>
-              </a:ext>
-            </a:extLst>
-          </p:cNvPr>
-          <p:cNvSpPr/>
+          <p:cNvPr id="3" name="Footer Placeholder 2">
+            <a:extLst>
+              <a:ext uri="{FF2B5EF4-FFF2-40B4-BE49-F238E27FC236}">
+                <a16:creationId xmlns:a16="http://schemas.microsoft.com/office/drawing/2014/main" id="{1036EAC4-6DDE-DD5B-3CF9-C5CD859E6DC2}"/>
+              </a:ext>
+            </a:extLst>
+          </p:cNvPr>
+          <p:cNvSpPr>
+            <a:spLocks noGrp="1"/>
+          </p:cNvSpPr>
+          <p:nvPr>
+            <p:ph type="ftr" sz="quarter" idx="11"/>
+          </p:nvPr>
+        </p:nvSpPr>
+        <p:spPr/>
+        <p:txBody>
+          <a:bodyPr/>
+          <a:lstStyle/>
+          <a:p>
+            <a:r>
+              <a:rPr lang="es-ES"/>
+              <a:t>Step 1 - Model - ver. 1</a:t>
+            </a:r>
+            <a:endParaRPr lang="ru-UA"/>
+          </a:p>
+        </p:txBody>
+      </p:sp>
+      <p:pic>
+        <p:nvPicPr>
+          <p:cNvPr id="4" name="Picture 3">
+            <a:extLst>
+              <a:ext uri="{FF2B5EF4-FFF2-40B4-BE49-F238E27FC236}">
+                <a16:creationId xmlns:a16="http://schemas.microsoft.com/office/drawing/2014/main" id="{318EBA90-4820-53D1-993B-2BFEBFC41459}"/>
+              </a:ext>
+            </a:extLst>
+          </p:cNvPr>
+          <p:cNvPicPr>
+            <a:picLocks noChangeAspect="1"/>
+          </p:cNvPicPr>
           <p:nvPr/>
-        </p:nvSpPr>
+        </p:nvPicPr>
+        <p:blipFill>
+          <a:blip r:embed="rId2"/>
+          <a:stretch>
+            <a:fillRect/>
+          </a:stretch>
+        </p:blipFill>
         <p:spPr>
           <a:xfrm>
-            <a:off x="5669280" y="1574019"/>
-            <a:ext cx="4728754" cy="3333750"/>
+            <a:off x="5277762" y="1829547"/>
+            <a:ext cx="5395428" cy="2822693"/>
           </a:xfrm>
           <a:prstGeom prst="rect">
             <a:avLst/>
           </a:prstGeom>
         </p:spPr>
-        <p:style>
-          <a:lnRef idx="2">
-            <a:schemeClr val="accent1">
-              <a:shade val="15000"/>
-            </a:schemeClr>
-          </a:lnRef>
-          <a:fillRef idx="1">
-            <a:schemeClr val="accent1"/>
-          </a:fillRef>
-          <a:effectRef idx="0">
-            <a:schemeClr val="accent1"/>
-          </a:effectRef>
-          <a:fontRef idx="minor">
-            <a:schemeClr val="lt1"/>
-          </a:fontRef>
-        </p:style>
-        <p:txBody>
-          <a:bodyPr rtlCol="0" anchor="ctr"/>
-          <a:lstStyle/>
-          <a:p>
-            <a:pPr algn="ctr"/>
-            <a:endParaRPr lang="ru-UA"/>
-          </a:p>
-        </p:txBody>
-      </p:sp>
-      <p:sp>
-        <p:nvSpPr>
-          <p:cNvPr id="3" name="Footer Placeholder 2">
-            <a:extLst>
-              <a:ext uri="{FF2B5EF4-FFF2-40B4-BE49-F238E27FC236}">
-                <a16:creationId xmlns:a16="http://schemas.microsoft.com/office/drawing/2014/main" id="{1036EAC4-6DDE-DD5B-3CF9-C5CD859E6DC2}"/>
-              </a:ext>
-            </a:extLst>
-          </p:cNvPr>
-          <p:cNvSpPr>
-            <a:spLocks noGrp="1"/>
-          </p:cNvSpPr>
-          <p:nvPr>
-            <p:ph type="ftr" sz="quarter" idx="11"/>
-          </p:nvPr>
-        </p:nvSpPr>
-        <p:spPr/>
-        <p:txBody>
-          <a:bodyPr/>
-          <a:lstStyle/>
-          <a:p>
-            <a:r>
-              <a:rPr lang="es-ES"/>
-              <a:t>Step 1 - Model - ver. 1</a:t>
-            </a:r>
-            <a:endParaRPr lang="ru-UA"/>
-          </a:p>
-        </p:txBody>
-      </p:sp>
+      </p:pic>
     </p:spTree>
     <p:extLst>
       <p:ext uri="{BB962C8B-B14F-4D97-AF65-F5344CB8AC3E}">
@@ -16377,79 +16601,63 @@
       </p:sp>
       <p:sp>
         <p:nvSpPr>
-          <p:cNvPr id="6" name="Rectangle 5">
-            <a:extLst>
-              <a:ext uri="{FF2B5EF4-FFF2-40B4-BE49-F238E27FC236}">
-                <a16:creationId xmlns:a16="http://schemas.microsoft.com/office/drawing/2014/main" id="{E04F08BD-B70E-B1A8-7328-EE29B18E4AA1}"/>
-              </a:ext>
-            </a:extLst>
-          </p:cNvPr>
-          <p:cNvSpPr/>
+          <p:cNvPr id="3" name="Footer Placeholder 2">
+            <a:extLst>
+              <a:ext uri="{FF2B5EF4-FFF2-40B4-BE49-F238E27FC236}">
+                <a16:creationId xmlns:a16="http://schemas.microsoft.com/office/drawing/2014/main" id="{1036EAC4-6DDE-DD5B-3CF9-C5CD859E6DC2}"/>
+              </a:ext>
+            </a:extLst>
+          </p:cNvPr>
+          <p:cNvSpPr>
+            <a:spLocks noGrp="1"/>
+          </p:cNvSpPr>
+          <p:nvPr>
+            <p:ph type="ftr" sz="quarter" idx="11"/>
+          </p:nvPr>
+        </p:nvSpPr>
+        <p:spPr/>
+        <p:txBody>
+          <a:bodyPr/>
+          <a:lstStyle/>
+          <a:p>
+            <a:r>
+              <a:rPr lang="es-ES"/>
+              <a:t>Step 1 - Model - ver. 1</a:t>
+            </a:r>
+            <a:endParaRPr lang="ru-UA"/>
+          </a:p>
+        </p:txBody>
+      </p:sp>
+      <p:pic>
+        <p:nvPicPr>
+          <p:cNvPr id="8" name="Picture 7">
+            <a:extLst>
+              <a:ext uri="{FF2B5EF4-FFF2-40B4-BE49-F238E27FC236}">
+                <a16:creationId xmlns:a16="http://schemas.microsoft.com/office/drawing/2014/main" id="{3BEB5BCB-4133-D791-E012-4082550F8E46}"/>
+              </a:ext>
+            </a:extLst>
+          </p:cNvPr>
+          <p:cNvPicPr>
+            <a:picLocks noChangeAspect="1"/>
+          </p:cNvPicPr>
           <p:nvPr/>
-        </p:nvSpPr>
+        </p:nvPicPr>
+        <p:blipFill>
+          <a:blip r:embed="rId2"/>
+          <a:stretch>
+            <a:fillRect/>
+          </a:stretch>
+        </p:blipFill>
         <p:spPr>
           <a:xfrm>
-            <a:off x="5669280" y="1574019"/>
-            <a:ext cx="4728754" cy="3333750"/>
+            <a:off x="4549764" y="1484707"/>
+            <a:ext cx="6492309" cy="3512374"/>
           </a:xfrm>
           <a:prstGeom prst="rect">
             <a:avLst/>
           </a:prstGeom>
         </p:spPr>
-        <p:style>
-          <a:lnRef idx="2">
-            <a:schemeClr val="accent1">
-              <a:shade val="15000"/>
-            </a:schemeClr>
-          </a:lnRef>
-          <a:fillRef idx="1">
-            <a:schemeClr val="accent1"/>
-          </a:fillRef>
-          <a:effectRef idx="0">
-            <a:schemeClr val="accent1"/>
-          </a:effectRef>
-          <a:fontRef idx="minor">
-            <a:schemeClr val="lt1"/>
-          </a:fontRef>
-        </p:style>
-        <p:txBody>
-          <a:bodyPr rtlCol="0" anchor="ctr"/>
-          <a:lstStyle/>
-          <a:p>
-            <a:pPr algn="ctr"/>
-            <a:endParaRPr lang="ru-UA"/>
-          </a:p>
-        </p:txBody>
-      </p:sp>
-      <p:sp>
-        <p:nvSpPr>
-          <p:cNvPr id="3" name="Footer Placeholder 2">
-            <a:extLst>
-              <a:ext uri="{FF2B5EF4-FFF2-40B4-BE49-F238E27FC236}">
-                <a16:creationId xmlns:a16="http://schemas.microsoft.com/office/drawing/2014/main" id="{1036EAC4-6DDE-DD5B-3CF9-C5CD859E6DC2}"/>
-              </a:ext>
-            </a:extLst>
-          </p:cNvPr>
-          <p:cNvSpPr>
-            <a:spLocks noGrp="1"/>
-          </p:cNvSpPr>
-          <p:nvPr>
-            <p:ph type="ftr" sz="quarter" idx="11"/>
-          </p:nvPr>
-        </p:nvSpPr>
-        <p:spPr/>
-        <p:txBody>
-          <a:bodyPr/>
-          <a:lstStyle/>
-          <a:p>
-            <a:r>
-              <a:rPr lang="es-ES"/>
-              <a:t>Step 1 - Model - ver. 1</a:t>
-            </a:r>
-            <a:endParaRPr lang="ru-UA"/>
-          </a:p>
-        </p:txBody>
-      </p:sp>
+      </p:pic>
     </p:spTree>
     <p:extLst>
       <p:ext uri="{BB962C8B-B14F-4D97-AF65-F5344CB8AC3E}">
@@ -17557,79 +17765,69 @@
       </p:sp>
       <p:sp>
         <p:nvSpPr>
-          <p:cNvPr id="6" name="Rectangle 5">
-            <a:extLst>
-              <a:ext uri="{FF2B5EF4-FFF2-40B4-BE49-F238E27FC236}">
-                <a16:creationId xmlns:a16="http://schemas.microsoft.com/office/drawing/2014/main" id="{E04F08BD-B70E-B1A8-7328-EE29B18E4AA1}"/>
-              </a:ext>
-            </a:extLst>
-          </p:cNvPr>
-          <p:cNvSpPr/>
+          <p:cNvPr id="3" name="Footer Placeholder 2">
+            <a:extLst>
+              <a:ext uri="{FF2B5EF4-FFF2-40B4-BE49-F238E27FC236}">
+                <a16:creationId xmlns:a16="http://schemas.microsoft.com/office/drawing/2014/main" id="{1036EAC4-6DDE-DD5B-3CF9-C5CD859E6DC2}"/>
+              </a:ext>
+            </a:extLst>
+          </p:cNvPr>
+          <p:cNvSpPr>
+            <a:spLocks noGrp="1"/>
+          </p:cNvSpPr>
+          <p:nvPr>
+            <p:ph type="ftr" sz="quarter" idx="11"/>
+          </p:nvPr>
+        </p:nvSpPr>
+        <p:spPr/>
+        <p:txBody>
+          <a:bodyPr/>
+          <a:lstStyle/>
+          <a:p>
+            <a:r>
+              <a:rPr lang="es-ES"/>
+              <a:t>Step 1 - Model - ver. 1</a:t>
+            </a:r>
+            <a:endParaRPr lang="ru-UA"/>
+          </a:p>
+        </p:txBody>
+      </p:sp>
+      <p:pic>
+        <p:nvPicPr>
+          <p:cNvPr id="5" name="Picture 4" descr="A diagram of a software development process&#10;&#10;Description automatically generated">
+            <a:extLst>
+              <a:ext uri="{FF2B5EF4-FFF2-40B4-BE49-F238E27FC236}">
+                <a16:creationId xmlns:a16="http://schemas.microsoft.com/office/drawing/2014/main" id="{57BC5937-2120-D4A1-5703-44715220912C}"/>
+              </a:ext>
+            </a:extLst>
+          </p:cNvPr>
+          <p:cNvPicPr>
+            <a:picLocks noChangeAspect="1"/>
+          </p:cNvPicPr>
           <p:nvPr/>
-        </p:nvSpPr>
+        </p:nvPicPr>
+        <p:blipFill>
+          <a:blip r:embed="rId2">
+            <a:extLst>
+              <a:ext uri="{28A0092B-C50C-407E-A947-70E740481C1C}">
+                <a14:useLocalDpi xmlns:a14="http://schemas.microsoft.com/office/drawing/2010/main" val="0"/>
+              </a:ext>
+            </a:extLst>
+          </a:blip>
+          <a:stretch>
+            <a:fillRect/>
+          </a:stretch>
+        </p:blipFill>
         <p:spPr>
           <a:xfrm>
-            <a:off x="5669280" y="1574019"/>
-            <a:ext cx="4728754" cy="3333750"/>
+            <a:off x="5265613" y="1778806"/>
+            <a:ext cx="5419725" cy="2924175"/>
           </a:xfrm>
           <a:prstGeom prst="rect">
             <a:avLst/>
           </a:prstGeom>
         </p:spPr>
-        <p:style>
-          <a:lnRef idx="2">
-            <a:schemeClr val="accent1">
-              <a:shade val="15000"/>
-            </a:schemeClr>
-          </a:lnRef>
-          <a:fillRef idx="1">
-            <a:schemeClr val="accent1"/>
-          </a:fillRef>
-          <a:effectRef idx="0">
-            <a:schemeClr val="accent1"/>
-          </a:effectRef>
-          <a:fontRef idx="minor">
-            <a:schemeClr val="lt1"/>
-          </a:fontRef>
-        </p:style>
-        <p:txBody>
-          <a:bodyPr rtlCol="0" anchor="ctr"/>
-          <a:lstStyle/>
-          <a:p>
-            <a:pPr algn="ctr"/>
-            <a:endParaRPr lang="ru-UA"/>
-          </a:p>
-        </p:txBody>
-      </p:sp>
-      <p:sp>
-        <p:nvSpPr>
-          <p:cNvPr id="3" name="Footer Placeholder 2">
-            <a:extLst>
-              <a:ext uri="{FF2B5EF4-FFF2-40B4-BE49-F238E27FC236}">
-                <a16:creationId xmlns:a16="http://schemas.microsoft.com/office/drawing/2014/main" id="{1036EAC4-6DDE-DD5B-3CF9-C5CD859E6DC2}"/>
-              </a:ext>
-            </a:extLst>
-          </p:cNvPr>
-          <p:cNvSpPr>
-            <a:spLocks noGrp="1"/>
-          </p:cNvSpPr>
-          <p:nvPr>
-            <p:ph type="ftr" sz="quarter" idx="11"/>
-          </p:nvPr>
-        </p:nvSpPr>
-        <p:spPr/>
-        <p:txBody>
-          <a:bodyPr/>
-          <a:lstStyle/>
-          <a:p>
-            <a:r>
-              <a:rPr lang="es-ES"/>
-              <a:t>Step 1 - Model - ver. 1</a:t>
-            </a:r>
-            <a:endParaRPr lang="ru-UA"/>
-          </a:p>
-        </p:txBody>
-      </p:sp>
+      </p:pic>
     </p:spTree>
     <p:extLst>
       <p:ext uri="{BB962C8B-B14F-4D97-AF65-F5344CB8AC3E}">
@@ -17802,79 +18000,69 @@
       </p:sp>
       <p:sp>
         <p:nvSpPr>
-          <p:cNvPr id="6" name="Rectangle 5">
-            <a:extLst>
-              <a:ext uri="{FF2B5EF4-FFF2-40B4-BE49-F238E27FC236}">
-                <a16:creationId xmlns:a16="http://schemas.microsoft.com/office/drawing/2014/main" id="{E04F08BD-B70E-B1A8-7328-EE29B18E4AA1}"/>
-              </a:ext>
-            </a:extLst>
-          </p:cNvPr>
-          <p:cNvSpPr/>
+          <p:cNvPr id="3" name="Footer Placeholder 2">
+            <a:extLst>
+              <a:ext uri="{FF2B5EF4-FFF2-40B4-BE49-F238E27FC236}">
+                <a16:creationId xmlns:a16="http://schemas.microsoft.com/office/drawing/2014/main" id="{1036EAC4-6DDE-DD5B-3CF9-C5CD859E6DC2}"/>
+              </a:ext>
+            </a:extLst>
+          </p:cNvPr>
+          <p:cNvSpPr>
+            <a:spLocks noGrp="1"/>
+          </p:cNvSpPr>
+          <p:nvPr>
+            <p:ph type="ftr" sz="quarter" idx="11"/>
+          </p:nvPr>
+        </p:nvSpPr>
+        <p:spPr/>
+        <p:txBody>
+          <a:bodyPr/>
+          <a:lstStyle/>
+          <a:p>
+            <a:r>
+              <a:rPr lang="es-ES"/>
+              <a:t>Step 1 - Model - ver. 1</a:t>
+            </a:r>
+            <a:endParaRPr lang="ru-UA"/>
+          </a:p>
+        </p:txBody>
+      </p:sp>
+      <p:pic>
+        <p:nvPicPr>
+          <p:cNvPr id="5" name="Picture 4" descr="A diagram of a software development process&#10;&#10;Description automatically generated">
+            <a:extLst>
+              <a:ext uri="{FF2B5EF4-FFF2-40B4-BE49-F238E27FC236}">
+                <a16:creationId xmlns:a16="http://schemas.microsoft.com/office/drawing/2014/main" id="{98AD4C22-F45A-B1FB-B5F4-0A006DF9C2E6}"/>
+              </a:ext>
+            </a:extLst>
+          </p:cNvPr>
+          <p:cNvPicPr>
+            <a:picLocks noChangeAspect="1"/>
+          </p:cNvPicPr>
           <p:nvPr/>
-        </p:nvSpPr>
+        </p:nvPicPr>
+        <p:blipFill>
+          <a:blip r:embed="rId2">
+            <a:extLst>
+              <a:ext uri="{28A0092B-C50C-407E-A947-70E740481C1C}">
+                <a14:useLocalDpi xmlns:a14="http://schemas.microsoft.com/office/drawing/2010/main" val="0"/>
+              </a:ext>
+            </a:extLst>
+          </a:blip>
+          <a:stretch>
+            <a:fillRect/>
+          </a:stretch>
+        </p:blipFill>
         <p:spPr>
           <a:xfrm>
-            <a:off x="5669280" y="1574019"/>
-            <a:ext cx="4728754" cy="3333750"/>
+            <a:off x="5443537" y="1778806"/>
+            <a:ext cx="5419725" cy="2924175"/>
           </a:xfrm>
           <a:prstGeom prst="rect">
             <a:avLst/>
           </a:prstGeom>
         </p:spPr>
-        <p:style>
-          <a:lnRef idx="2">
-            <a:schemeClr val="accent1">
-              <a:shade val="15000"/>
-            </a:schemeClr>
-          </a:lnRef>
-          <a:fillRef idx="1">
-            <a:schemeClr val="accent1"/>
-          </a:fillRef>
-          <a:effectRef idx="0">
-            <a:schemeClr val="accent1"/>
-          </a:effectRef>
-          <a:fontRef idx="minor">
-            <a:schemeClr val="lt1"/>
-          </a:fontRef>
-        </p:style>
-        <p:txBody>
-          <a:bodyPr rtlCol="0" anchor="ctr"/>
-          <a:lstStyle/>
-          <a:p>
-            <a:pPr algn="ctr"/>
-            <a:endParaRPr lang="ru-UA"/>
-          </a:p>
-        </p:txBody>
-      </p:sp>
-      <p:sp>
-        <p:nvSpPr>
-          <p:cNvPr id="3" name="Footer Placeholder 2">
-            <a:extLst>
-              <a:ext uri="{FF2B5EF4-FFF2-40B4-BE49-F238E27FC236}">
-                <a16:creationId xmlns:a16="http://schemas.microsoft.com/office/drawing/2014/main" id="{1036EAC4-6DDE-DD5B-3CF9-C5CD859E6DC2}"/>
-              </a:ext>
-            </a:extLst>
-          </p:cNvPr>
-          <p:cNvSpPr>
-            <a:spLocks noGrp="1"/>
-          </p:cNvSpPr>
-          <p:nvPr>
-            <p:ph type="ftr" sz="quarter" idx="11"/>
-          </p:nvPr>
-        </p:nvSpPr>
-        <p:spPr/>
-        <p:txBody>
-          <a:bodyPr/>
-          <a:lstStyle/>
-          <a:p>
-            <a:r>
-              <a:rPr lang="es-ES"/>
-              <a:t>Step 1 - Model - ver. 1</a:t>
-            </a:r>
-            <a:endParaRPr lang="ru-UA"/>
-          </a:p>
-        </p:txBody>
-      </p:sp>
+      </p:pic>
     </p:spTree>
     <p:extLst>
       <p:ext uri="{BB962C8B-B14F-4D97-AF65-F5344CB8AC3E}">
@@ -18047,79 +18235,69 @@
       </p:sp>
       <p:sp>
         <p:nvSpPr>
-          <p:cNvPr id="6" name="Rectangle 5">
-            <a:extLst>
-              <a:ext uri="{FF2B5EF4-FFF2-40B4-BE49-F238E27FC236}">
-                <a16:creationId xmlns:a16="http://schemas.microsoft.com/office/drawing/2014/main" id="{E04F08BD-B70E-B1A8-7328-EE29B18E4AA1}"/>
-              </a:ext>
-            </a:extLst>
-          </p:cNvPr>
-          <p:cNvSpPr/>
+          <p:cNvPr id="3" name="Footer Placeholder 2">
+            <a:extLst>
+              <a:ext uri="{FF2B5EF4-FFF2-40B4-BE49-F238E27FC236}">
+                <a16:creationId xmlns:a16="http://schemas.microsoft.com/office/drawing/2014/main" id="{1036EAC4-6DDE-DD5B-3CF9-C5CD859E6DC2}"/>
+              </a:ext>
+            </a:extLst>
+          </p:cNvPr>
+          <p:cNvSpPr>
+            <a:spLocks noGrp="1"/>
+          </p:cNvSpPr>
+          <p:nvPr>
+            <p:ph type="ftr" sz="quarter" idx="11"/>
+          </p:nvPr>
+        </p:nvSpPr>
+        <p:spPr/>
+        <p:txBody>
+          <a:bodyPr/>
+          <a:lstStyle/>
+          <a:p>
+            <a:r>
+              <a:rPr lang="es-ES"/>
+              <a:t>Step 1 - Model - ver. 1</a:t>
+            </a:r>
+            <a:endParaRPr lang="ru-UA"/>
+          </a:p>
+        </p:txBody>
+      </p:sp>
+      <p:pic>
+        <p:nvPicPr>
+          <p:cNvPr id="5" name="Picture 4" descr="A diagram of a software development process&#10;&#10;Description automatically generated">
+            <a:extLst>
+              <a:ext uri="{FF2B5EF4-FFF2-40B4-BE49-F238E27FC236}">
+                <a16:creationId xmlns:a16="http://schemas.microsoft.com/office/drawing/2014/main" id="{7006CD2F-79F3-55BB-9846-61F935AC39F3}"/>
+              </a:ext>
+            </a:extLst>
+          </p:cNvPr>
+          <p:cNvPicPr>
+            <a:picLocks noChangeAspect="1"/>
+          </p:cNvPicPr>
           <p:nvPr/>
-        </p:nvSpPr>
+        </p:nvPicPr>
+        <p:blipFill>
+          <a:blip r:embed="rId2">
+            <a:extLst>
+              <a:ext uri="{28A0092B-C50C-407E-A947-70E740481C1C}">
+                <a14:useLocalDpi xmlns:a14="http://schemas.microsoft.com/office/drawing/2010/main" val="0"/>
+              </a:ext>
+            </a:extLst>
+          </a:blip>
+          <a:stretch>
+            <a:fillRect/>
+          </a:stretch>
+        </p:blipFill>
         <p:spPr>
           <a:xfrm>
-            <a:off x="5669280" y="1574019"/>
-            <a:ext cx="4728754" cy="3333750"/>
+            <a:off x="5575156" y="1778806"/>
+            <a:ext cx="5419725" cy="2924175"/>
           </a:xfrm>
           <a:prstGeom prst="rect">
             <a:avLst/>
           </a:prstGeom>
         </p:spPr>
-        <p:style>
-          <a:lnRef idx="2">
-            <a:schemeClr val="accent1">
-              <a:shade val="15000"/>
-            </a:schemeClr>
-          </a:lnRef>
-          <a:fillRef idx="1">
-            <a:schemeClr val="accent1"/>
-          </a:fillRef>
-          <a:effectRef idx="0">
-            <a:schemeClr val="accent1"/>
-          </a:effectRef>
-          <a:fontRef idx="minor">
-            <a:schemeClr val="lt1"/>
-          </a:fontRef>
-        </p:style>
-        <p:txBody>
-          <a:bodyPr rtlCol="0" anchor="ctr"/>
-          <a:lstStyle/>
-          <a:p>
-            <a:pPr algn="ctr"/>
-            <a:endParaRPr lang="ru-UA"/>
-          </a:p>
-        </p:txBody>
-      </p:sp>
-      <p:sp>
-        <p:nvSpPr>
-          <p:cNvPr id="3" name="Footer Placeholder 2">
-            <a:extLst>
-              <a:ext uri="{FF2B5EF4-FFF2-40B4-BE49-F238E27FC236}">
-                <a16:creationId xmlns:a16="http://schemas.microsoft.com/office/drawing/2014/main" id="{1036EAC4-6DDE-DD5B-3CF9-C5CD859E6DC2}"/>
-              </a:ext>
-            </a:extLst>
-          </p:cNvPr>
-          <p:cNvSpPr>
-            <a:spLocks noGrp="1"/>
-          </p:cNvSpPr>
-          <p:nvPr>
-            <p:ph type="ftr" sz="quarter" idx="11"/>
-          </p:nvPr>
-        </p:nvSpPr>
-        <p:spPr/>
-        <p:txBody>
-          <a:bodyPr/>
-          <a:lstStyle/>
-          <a:p>
-            <a:r>
-              <a:rPr lang="es-ES"/>
-              <a:t>Step 1 - Model - ver. 1</a:t>
-            </a:r>
-            <a:endParaRPr lang="ru-UA"/>
-          </a:p>
-        </p:txBody>
-      </p:sp>
+      </p:pic>
     </p:spTree>
     <p:extLst>
       <p:ext uri="{BB962C8B-B14F-4D97-AF65-F5344CB8AC3E}">
@@ -18292,79 +18470,69 @@
       </p:sp>
       <p:sp>
         <p:nvSpPr>
-          <p:cNvPr id="6" name="Rectangle 5">
-            <a:extLst>
-              <a:ext uri="{FF2B5EF4-FFF2-40B4-BE49-F238E27FC236}">
-                <a16:creationId xmlns:a16="http://schemas.microsoft.com/office/drawing/2014/main" id="{E04F08BD-B70E-B1A8-7328-EE29B18E4AA1}"/>
-              </a:ext>
-            </a:extLst>
-          </p:cNvPr>
-          <p:cNvSpPr/>
+          <p:cNvPr id="3" name="Footer Placeholder 2">
+            <a:extLst>
+              <a:ext uri="{FF2B5EF4-FFF2-40B4-BE49-F238E27FC236}">
+                <a16:creationId xmlns:a16="http://schemas.microsoft.com/office/drawing/2014/main" id="{1036EAC4-6DDE-DD5B-3CF9-C5CD859E6DC2}"/>
+              </a:ext>
+            </a:extLst>
+          </p:cNvPr>
+          <p:cNvSpPr>
+            <a:spLocks noGrp="1"/>
+          </p:cNvSpPr>
+          <p:nvPr>
+            <p:ph type="ftr" sz="quarter" idx="11"/>
+          </p:nvPr>
+        </p:nvSpPr>
+        <p:spPr/>
+        <p:txBody>
+          <a:bodyPr/>
+          <a:lstStyle/>
+          <a:p>
+            <a:r>
+              <a:rPr lang="es-ES"/>
+              <a:t>Step 1 - Model - ver. 1</a:t>
+            </a:r>
+            <a:endParaRPr lang="ru-UA"/>
+          </a:p>
+        </p:txBody>
+      </p:sp>
+      <p:pic>
+        <p:nvPicPr>
+          <p:cNvPr id="5" name="Picture 4" descr="A diagram of a software development process&#10;&#10;Description automatically generated">
+            <a:extLst>
+              <a:ext uri="{FF2B5EF4-FFF2-40B4-BE49-F238E27FC236}">
+                <a16:creationId xmlns:a16="http://schemas.microsoft.com/office/drawing/2014/main" id="{4530C90C-B940-4FB1-7CCB-6BBD2F58C875}"/>
+              </a:ext>
+            </a:extLst>
+          </p:cNvPr>
+          <p:cNvPicPr>
+            <a:picLocks noChangeAspect="1"/>
+          </p:cNvPicPr>
           <p:nvPr/>
-        </p:nvSpPr>
+        </p:nvPicPr>
+        <p:blipFill>
+          <a:blip r:embed="rId2">
+            <a:extLst>
+              <a:ext uri="{28A0092B-C50C-407E-A947-70E740481C1C}">
+                <a14:useLocalDpi xmlns:a14="http://schemas.microsoft.com/office/drawing/2010/main" val="0"/>
+              </a:ext>
+            </a:extLst>
+          </a:blip>
+          <a:stretch>
+            <a:fillRect/>
+          </a:stretch>
+        </p:blipFill>
         <p:spPr>
           <a:xfrm>
-            <a:off x="5669280" y="1574019"/>
-            <a:ext cx="4728754" cy="3333750"/>
+            <a:off x="5265613" y="1966912"/>
+            <a:ext cx="5419725" cy="2924175"/>
           </a:xfrm>
           <a:prstGeom prst="rect">
             <a:avLst/>
           </a:prstGeom>
         </p:spPr>
-        <p:style>
-          <a:lnRef idx="2">
-            <a:schemeClr val="accent1">
-              <a:shade val="15000"/>
-            </a:schemeClr>
-          </a:lnRef>
-          <a:fillRef idx="1">
-            <a:schemeClr val="accent1"/>
-          </a:fillRef>
-          <a:effectRef idx="0">
-            <a:schemeClr val="accent1"/>
-          </a:effectRef>
-          <a:fontRef idx="minor">
-            <a:schemeClr val="lt1"/>
-          </a:fontRef>
-        </p:style>
-        <p:txBody>
-          <a:bodyPr rtlCol="0" anchor="ctr"/>
-          <a:lstStyle/>
-          <a:p>
-            <a:pPr algn="ctr"/>
-            <a:endParaRPr lang="ru-UA"/>
-          </a:p>
-        </p:txBody>
-      </p:sp>
-      <p:sp>
-        <p:nvSpPr>
-          <p:cNvPr id="3" name="Footer Placeholder 2">
-            <a:extLst>
-              <a:ext uri="{FF2B5EF4-FFF2-40B4-BE49-F238E27FC236}">
-                <a16:creationId xmlns:a16="http://schemas.microsoft.com/office/drawing/2014/main" id="{1036EAC4-6DDE-DD5B-3CF9-C5CD859E6DC2}"/>
-              </a:ext>
-            </a:extLst>
-          </p:cNvPr>
-          <p:cNvSpPr>
-            <a:spLocks noGrp="1"/>
-          </p:cNvSpPr>
-          <p:nvPr>
-            <p:ph type="ftr" sz="quarter" idx="11"/>
-          </p:nvPr>
-        </p:nvSpPr>
-        <p:spPr/>
-        <p:txBody>
-          <a:bodyPr/>
-          <a:lstStyle/>
-          <a:p>
-            <a:r>
-              <a:rPr lang="es-ES"/>
-              <a:t>Step 1 - Model - ver. 1</a:t>
-            </a:r>
-            <a:endParaRPr lang="ru-UA"/>
-          </a:p>
-        </p:txBody>
-      </p:sp>
+      </p:pic>
     </p:spTree>
     <p:extLst>
       <p:ext uri="{BB962C8B-B14F-4D97-AF65-F5344CB8AC3E}">
@@ -18537,79 +18705,69 @@
       </p:sp>
       <p:sp>
         <p:nvSpPr>
-          <p:cNvPr id="6" name="Rectangle 5">
-            <a:extLst>
-              <a:ext uri="{FF2B5EF4-FFF2-40B4-BE49-F238E27FC236}">
-                <a16:creationId xmlns:a16="http://schemas.microsoft.com/office/drawing/2014/main" id="{E04F08BD-B70E-B1A8-7328-EE29B18E4AA1}"/>
-              </a:ext>
-            </a:extLst>
-          </p:cNvPr>
-          <p:cNvSpPr/>
+          <p:cNvPr id="3" name="Footer Placeholder 2">
+            <a:extLst>
+              <a:ext uri="{FF2B5EF4-FFF2-40B4-BE49-F238E27FC236}">
+                <a16:creationId xmlns:a16="http://schemas.microsoft.com/office/drawing/2014/main" id="{1036EAC4-6DDE-DD5B-3CF9-C5CD859E6DC2}"/>
+              </a:ext>
+            </a:extLst>
+          </p:cNvPr>
+          <p:cNvSpPr>
+            <a:spLocks noGrp="1"/>
+          </p:cNvSpPr>
+          <p:nvPr>
+            <p:ph type="ftr" sz="quarter" idx="11"/>
+          </p:nvPr>
+        </p:nvSpPr>
+        <p:spPr/>
+        <p:txBody>
+          <a:bodyPr/>
+          <a:lstStyle/>
+          <a:p>
+            <a:r>
+              <a:rPr lang="es-ES"/>
+              <a:t>Step 1 - Model - ver. 1</a:t>
+            </a:r>
+            <a:endParaRPr lang="ru-UA"/>
+          </a:p>
+        </p:txBody>
+      </p:sp>
+      <p:pic>
+        <p:nvPicPr>
+          <p:cNvPr id="5" name="Picture 4" descr="A diagram of a software development process&#10;&#10;Description automatically generated">
+            <a:extLst>
+              <a:ext uri="{FF2B5EF4-FFF2-40B4-BE49-F238E27FC236}">
+                <a16:creationId xmlns:a16="http://schemas.microsoft.com/office/drawing/2014/main" id="{E3FBA99F-8C18-85B9-0249-98AC2FBC3E84}"/>
+              </a:ext>
+            </a:extLst>
+          </p:cNvPr>
+          <p:cNvPicPr>
+            <a:picLocks noChangeAspect="1"/>
+          </p:cNvPicPr>
           <p:nvPr/>
-        </p:nvSpPr>
+        </p:nvPicPr>
+        <p:blipFill>
+          <a:blip r:embed="rId2">
+            <a:extLst>
+              <a:ext uri="{28A0092B-C50C-407E-A947-70E740481C1C}">
+                <a14:useLocalDpi xmlns:a14="http://schemas.microsoft.com/office/drawing/2010/main" val="0"/>
+              </a:ext>
+            </a:extLst>
+          </a:blip>
+          <a:stretch>
+            <a:fillRect/>
+          </a:stretch>
+        </p:blipFill>
         <p:spPr>
           <a:xfrm>
-            <a:off x="5669280" y="1574019"/>
-            <a:ext cx="4728754" cy="3333750"/>
+            <a:off x="5644428" y="1778806"/>
+            <a:ext cx="5419725" cy="2924175"/>
           </a:xfrm>
           <a:prstGeom prst="rect">
             <a:avLst/>
           </a:prstGeom>
         </p:spPr>
-        <p:style>
-          <a:lnRef idx="2">
-            <a:schemeClr val="accent1">
-              <a:shade val="15000"/>
-            </a:schemeClr>
-          </a:lnRef>
-          <a:fillRef idx="1">
-            <a:schemeClr val="accent1"/>
-          </a:fillRef>
-          <a:effectRef idx="0">
-            <a:schemeClr val="accent1"/>
-          </a:effectRef>
-          <a:fontRef idx="minor">
-            <a:schemeClr val="lt1"/>
-          </a:fontRef>
-        </p:style>
-        <p:txBody>
-          <a:bodyPr rtlCol="0" anchor="ctr"/>
-          <a:lstStyle/>
-          <a:p>
-            <a:pPr algn="ctr"/>
-            <a:endParaRPr lang="ru-UA"/>
-          </a:p>
-        </p:txBody>
-      </p:sp>
-      <p:sp>
-        <p:nvSpPr>
-          <p:cNvPr id="3" name="Footer Placeholder 2">
-            <a:extLst>
-              <a:ext uri="{FF2B5EF4-FFF2-40B4-BE49-F238E27FC236}">
-                <a16:creationId xmlns:a16="http://schemas.microsoft.com/office/drawing/2014/main" id="{1036EAC4-6DDE-DD5B-3CF9-C5CD859E6DC2}"/>
-              </a:ext>
-            </a:extLst>
-          </p:cNvPr>
-          <p:cNvSpPr>
-            <a:spLocks noGrp="1"/>
-          </p:cNvSpPr>
-          <p:nvPr>
-            <p:ph type="ftr" sz="quarter" idx="11"/>
-          </p:nvPr>
-        </p:nvSpPr>
-        <p:spPr/>
-        <p:txBody>
-          <a:bodyPr/>
-          <a:lstStyle/>
-          <a:p>
-            <a:r>
-              <a:rPr lang="es-ES"/>
-              <a:t>Step 1 - Model - ver. 1</a:t>
-            </a:r>
-            <a:endParaRPr lang="ru-UA"/>
-          </a:p>
-        </p:txBody>
-      </p:sp>
+      </p:pic>
     </p:spTree>
     <p:extLst>
       <p:ext uri="{BB962C8B-B14F-4D97-AF65-F5344CB8AC3E}">
@@ -18760,79 +18918,69 @@
       </p:sp>
       <p:sp>
         <p:nvSpPr>
-          <p:cNvPr id="6" name="Rectangle 5">
-            <a:extLst>
-              <a:ext uri="{FF2B5EF4-FFF2-40B4-BE49-F238E27FC236}">
-                <a16:creationId xmlns:a16="http://schemas.microsoft.com/office/drawing/2014/main" id="{E04F08BD-B70E-B1A8-7328-EE29B18E4AA1}"/>
-              </a:ext>
-            </a:extLst>
-          </p:cNvPr>
-          <p:cNvSpPr/>
+          <p:cNvPr id="3" name="Footer Placeholder 2">
+            <a:extLst>
+              <a:ext uri="{FF2B5EF4-FFF2-40B4-BE49-F238E27FC236}">
+                <a16:creationId xmlns:a16="http://schemas.microsoft.com/office/drawing/2014/main" id="{1036EAC4-6DDE-DD5B-3CF9-C5CD859E6DC2}"/>
+              </a:ext>
+            </a:extLst>
+          </p:cNvPr>
+          <p:cNvSpPr>
+            <a:spLocks noGrp="1"/>
+          </p:cNvSpPr>
+          <p:nvPr>
+            <p:ph type="ftr" sz="quarter" idx="11"/>
+          </p:nvPr>
+        </p:nvSpPr>
+        <p:spPr/>
+        <p:txBody>
+          <a:bodyPr/>
+          <a:lstStyle/>
+          <a:p>
+            <a:r>
+              <a:rPr lang="es-ES"/>
+              <a:t>Step 1 - Model - ver. 1</a:t>
+            </a:r>
+            <a:endParaRPr lang="ru-UA"/>
+          </a:p>
+        </p:txBody>
+      </p:sp>
+      <p:pic>
+        <p:nvPicPr>
+          <p:cNvPr id="5" name="Picture 4" descr="A diagram of a software development process&#10;&#10;Description automatically generated">
+            <a:extLst>
+              <a:ext uri="{FF2B5EF4-FFF2-40B4-BE49-F238E27FC236}">
+                <a16:creationId xmlns:a16="http://schemas.microsoft.com/office/drawing/2014/main" id="{A37A9516-F364-2AFA-3476-8348D5465658}"/>
+              </a:ext>
+            </a:extLst>
+          </p:cNvPr>
+          <p:cNvPicPr>
+            <a:picLocks noChangeAspect="1"/>
+          </p:cNvPicPr>
           <p:nvPr/>
-        </p:nvSpPr>
+        </p:nvPicPr>
+        <p:blipFill>
+          <a:blip r:embed="rId2">
+            <a:extLst>
+              <a:ext uri="{28A0092B-C50C-407E-A947-70E740481C1C}">
+                <a14:useLocalDpi xmlns:a14="http://schemas.microsoft.com/office/drawing/2010/main" val="0"/>
+              </a:ext>
+            </a:extLst>
+          </a:blip>
+          <a:stretch>
+            <a:fillRect/>
+          </a:stretch>
+        </p:blipFill>
         <p:spPr>
           <a:xfrm>
-            <a:off x="5669280" y="1574019"/>
-            <a:ext cx="4728754" cy="3333750"/>
+            <a:off x="5827895" y="1966912"/>
+            <a:ext cx="5419725" cy="2924175"/>
           </a:xfrm>
           <a:prstGeom prst="rect">
             <a:avLst/>
           </a:prstGeom>
         </p:spPr>
-        <p:style>
-          <a:lnRef idx="2">
-            <a:schemeClr val="accent1">
-              <a:shade val="15000"/>
-            </a:schemeClr>
-          </a:lnRef>
-          <a:fillRef idx="1">
-            <a:schemeClr val="accent1"/>
-          </a:fillRef>
-          <a:effectRef idx="0">
-            <a:schemeClr val="accent1"/>
-          </a:effectRef>
-          <a:fontRef idx="minor">
-            <a:schemeClr val="lt1"/>
-          </a:fontRef>
-        </p:style>
-        <p:txBody>
-          <a:bodyPr rtlCol="0" anchor="ctr"/>
-          <a:lstStyle/>
-          <a:p>
-            <a:pPr algn="ctr"/>
-            <a:endParaRPr lang="ru-UA"/>
-          </a:p>
-        </p:txBody>
-      </p:sp>
-      <p:sp>
-        <p:nvSpPr>
-          <p:cNvPr id="3" name="Footer Placeholder 2">
-            <a:extLst>
-              <a:ext uri="{FF2B5EF4-FFF2-40B4-BE49-F238E27FC236}">
-                <a16:creationId xmlns:a16="http://schemas.microsoft.com/office/drawing/2014/main" id="{1036EAC4-6DDE-DD5B-3CF9-C5CD859E6DC2}"/>
-              </a:ext>
-            </a:extLst>
-          </p:cNvPr>
-          <p:cNvSpPr>
-            <a:spLocks noGrp="1"/>
-          </p:cNvSpPr>
-          <p:nvPr>
-            <p:ph type="ftr" sz="quarter" idx="11"/>
-          </p:nvPr>
-        </p:nvSpPr>
-        <p:spPr/>
-        <p:txBody>
-          <a:bodyPr/>
-          <a:lstStyle/>
-          <a:p>
-            <a:r>
-              <a:rPr lang="es-ES"/>
-              <a:t>Step 1 - Model - ver. 1</a:t>
-            </a:r>
-            <a:endParaRPr lang="ru-UA"/>
-          </a:p>
-        </p:txBody>
-      </p:sp>
+      </p:pic>
     </p:spTree>
     <p:extLst>
       <p:ext uri="{BB962C8B-B14F-4D97-AF65-F5344CB8AC3E}">

</xml_diff>